<commit_message>
add word reduction to prez
</commit_message>
<xml_diff>
--- a/Presentations/NLP - Narrative.pptx
+++ b/Presentations/NLP - Narrative.pptx
@@ -23,8 +23,11 @@
     <p:sldId id="270" r:id="rId17"/>
     <p:sldId id="273" r:id="rId18"/>
     <p:sldId id="274" r:id="rId19"/>
-    <p:sldId id="275" r:id="rId20"/>
-    <p:sldId id="276" r:id="rId21"/>
+    <p:sldId id="279" r:id="rId20"/>
+    <p:sldId id="278" r:id="rId21"/>
+    <p:sldId id="277" r:id="rId22"/>
+    <p:sldId id="275" r:id="rId23"/>
+    <p:sldId id="276" r:id="rId24"/>
   </p:sldIdLst>
   <p:sldSz cx="9144000" cy="6858000" type="screen4x3"/>
   <p:notesSz cx="6858000" cy="9144000"/>
@@ -308,7 +311,7 @@
             <a:fld id="{1D8BD707-D9CF-40AE-B4C6-C98DA3205C09}" type="datetimeFigureOut">
               <a:rPr lang="en-US" smtClean="0"/>
               <a:pPr/>
-              <a:t>6/26/2017</a:t>
+              <a:t>6/28/2017</a:t>
             </a:fld>
             <a:endParaRPr lang="en-US"/>
           </a:p>
@@ -475,7 +478,7 @@
             <a:fld id="{1D8BD707-D9CF-40AE-B4C6-C98DA3205C09}" type="datetimeFigureOut">
               <a:rPr lang="en-US" smtClean="0"/>
               <a:pPr/>
-              <a:t>6/26/2017</a:t>
+              <a:t>6/28/2017</a:t>
             </a:fld>
             <a:endParaRPr lang="en-US"/>
           </a:p>
@@ -652,7 +655,7 @@
             <a:fld id="{1D8BD707-D9CF-40AE-B4C6-C98DA3205C09}" type="datetimeFigureOut">
               <a:rPr lang="en-US" smtClean="0"/>
               <a:pPr/>
-              <a:t>6/26/2017</a:t>
+              <a:t>6/28/2017</a:t>
             </a:fld>
             <a:endParaRPr lang="en-US"/>
           </a:p>
@@ -819,7 +822,7 @@
             <a:fld id="{1D8BD707-D9CF-40AE-B4C6-C98DA3205C09}" type="datetimeFigureOut">
               <a:rPr lang="en-US" smtClean="0"/>
               <a:pPr/>
-              <a:t>6/26/2017</a:t>
+              <a:t>6/28/2017</a:t>
             </a:fld>
             <a:endParaRPr lang="en-US"/>
           </a:p>
@@ -1062,7 +1065,7 @@
             <a:fld id="{1D8BD707-D9CF-40AE-B4C6-C98DA3205C09}" type="datetimeFigureOut">
               <a:rPr lang="en-US" smtClean="0"/>
               <a:pPr/>
-              <a:t>6/26/2017</a:t>
+              <a:t>6/28/2017</a:t>
             </a:fld>
             <a:endParaRPr lang="en-US"/>
           </a:p>
@@ -1347,7 +1350,7 @@
             <a:fld id="{1D8BD707-D9CF-40AE-B4C6-C98DA3205C09}" type="datetimeFigureOut">
               <a:rPr lang="en-US" smtClean="0"/>
               <a:pPr/>
-              <a:t>6/26/2017</a:t>
+              <a:t>6/28/2017</a:t>
             </a:fld>
             <a:endParaRPr lang="en-US"/>
           </a:p>
@@ -1766,7 +1769,7 @@
             <a:fld id="{1D8BD707-D9CF-40AE-B4C6-C98DA3205C09}" type="datetimeFigureOut">
               <a:rPr lang="en-US" smtClean="0"/>
               <a:pPr/>
-              <a:t>6/26/2017</a:t>
+              <a:t>6/28/2017</a:t>
             </a:fld>
             <a:endParaRPr lang="en-US"/>
           </a:p>
@@ -1881,7 +1884,7 @@
             <a:fld id="{1D8BD707-D9CF-40AE-B4C6-C98DA3205C09}" type="datetimeFigureOut">
               <a:rPr lang="en-US" smtClean="0"/>
               <a:pPr/>
-              <a:t>6/26/2017</a:t>
+              <a:t>6/28/2017</a:t>
             </a:fld>
             <a:endParaRPr lang="en-US"/>
           </a:p>
@@ -1973,7 +1976,7 @@
             <a:fld id="{1D8BD707-D9CF-40AE-B4C6-C98DA3205C09}" type="datetimeFigureOut">
               <a:rPr lang="en-US" smtClean="0"/>
               <a:pPr/>
-              <a:t>6/26/2017</a:t>
+              <a:t>6/28/2017</a:t>
             </a:fld>
             <a:endParaRPr lang="en-US"/>
           </a:p>
@@ -2247,7 +2250,7 @@
             <a:fld id="{1D8BD707-D9CF-40AE-B4C6-C98DA3205C09}" type="datetimeFigureOut">
               <a:rPr lang="en-US" smtClean="0"/>
               <a:pPr/>
-              <a:t>6/26/2017</a:t>
+              <a:t>6/28/2017</a:t>
             </a:fld>
             <a:endParaRPr lang="en-US"/>
           </a:p>
@@ -2497,7 +2500,7 @@
             <a:fld id="{1D8BD707-D9CF-40AE-B4C6-C98DA3205C09}" type="datetimeFigureOut">
               <a:rPr lang="en-US" smtClean="0"/>
               <a:pPr/>
-              <a:t>6/26/2017</a:t>
+              <a:t>6/28/2017</a:t>
             </a:fld>
             <a:endParaRPr lang="en-US"/>
           </a:p>
@@ -2707,7 +2710,7 @@
             <a:fld id="{1D8BD707-D9CF-40AE-B4C6-C98DA3205C09}" type="datetimeFigureOut">
               <a:rPr lang="en-US" smtClean="0"/>
               <a:pPr/>
-              <a:t>6/26/2017</a:t>
+              <a:t>6/28/2017</a:t>
             </a:fld>
             <a:endParaRPr lang="en-US"/>
           </a:p>
@@ -8263,7 +8266,7 @@
         <p:spPr>
           <a:xfrm>
             <a:off x="457200" y="274638"/>
-            <a:ext cx="7848600" cy="792162"/>
+            <a:ext cx="8305800" cy="792162"/>
           </a:xfrm>
         </p:spPr>
         <p:txBody>
@@ -8281,7 +8284,7 @@
                   </a:schemeClr>
                 </a:solidFill>
               </a:rPr>
-              <a:t>More – Not Covered</a:t>
+              <a:t>Advance Topic – Word Reduction</a:t>
             </a:r>
             <a:endParaRPr lang="en-US" dirty="0">
               <a:solidFill>
@@ -8380,7 +8383,7 @@
         <p:spPr>
           <a:xfrm>
             <a:off x="457200" y="1447797"/>
-            <a:ext cx="7281865" cy="4401205"/>
+            <a:ext cx="8855822" cy="4832092"/>
           </a:xfrm>
           <a:prstGeom prst="rect">
             <a:avLst/>
@@ -8400,15 +8403,124 @@
             <a:r>
               <a:rPr lang="en-US" sz="2800" dirty="0" smtClean="0">
                 <a:solidFill>
-                  <a:schemeClr val="accent6">
-                    <a:lumMod val="50000"/>
-                  </a:schemeClr>
+                  <a:srgbClr val="0070C0"/>
                 </a:solidFill>
               </a:rPr>
-              <a:t>Word Reduction (man, men, boy, guy =&gt; male)</a:t>
-            </a:r>
-          </a:p>
-          <a:p>
+              <a:t>Words that are part of a common grouping are replaced</a:t>
+            </a:r>
+            <a:br>
+              <a:rPr lang="en-US" sz="2800" dirty="0" smtClean="0">
+                <a:solidFill>
+                  <a:srgbClr val="0070C0"/>
+                </a:solidFill>
+              </a:rPr>
+            </a:br>
+            <a:r>
+              <a:rPr lang="en-US" sz="2800" dirty="0" smtClean="0">
+                <a:solidFill>
+                  <a:srgbClr val="0070C0"/>
+                </a:solidFill>
+              </a:rPr>
+              <a:t>with a root word for the group.</a:t>
+            </a:r>
+          </a:p>
+          <a:p>
+            <a:pPr marL="342900" indent="-342900">
+              <a:buFont typeface="Arial" panose="020B0604020202020204" pitchFamily="34" charset="0"/>
+              <a:buChar char="•"/>
+            </a:pPr>
+            <a:endParaRPr lang="en-US" sz="2800" dirty="0">
+              <a:solidFill>
+                <a:schemeClr val="accent6">
+                  <a:lumMod val="50000"/>
+                </a:schemeClr>
+              </a:solidFill>
+            </a:endParaRPr>
+          </a:p>
+          <a:p>
+            <a:pPr marL="342900" indent="-342900">
+              <a:buFont typeface="Arial" panose="020B0604020202020204" pitchFamily="34" charset="0"/>
+              <a:buChar char="•"/>
+            </a:pPr>
+            <a:r>
+              <a:rPr lang="en-US" sz="2800" dirty="0" smtClean="0">
+                <a:solidFill>
+                  <a:srgbClr val="0070C0"/>
+                </a:solidFill>
+              </a:rPr>
+              <a:t>Steps:</a:t>
+            </a:r>
+          </a:p>
+          <a:p>
+            <a:pPr marL="971550" lvl="1" indent="-514350">
+              <a:buFont typeface="+mj-lt"/>
+              <a:buAutoNum type="arabicPeriod"/>
+            </a:pPr>
+            <a:r>
+              <a:rPr lang="en-US" sz="2800" dirty="0" smtClean="0">
+                <a:solidFill>
+                  <a:srgbClr val="0070C0"/>
+                </a:solidFill>
+              </a:rPr>
+              <a:t>Stemming/Lemmatization</a:t>
+            </a:r>
+          </a:p>
+          <a:p>
+            <a:pPr marL="971550" lvl="1" indent="-514350">
+              <a:buFont typeface="+mj-lt"/>
+              <a:buAutoNum type="arabicPeriod"/>
+            </a:pPr>
+            <a:r>
+              <a:rPr lang="en-US" sz="2800" dirty="0" smtClean="0">
+                <a:solidFill>
+                  <a:srgbClr val="0070C0"/>
+                </a:solidFill>
+              </a:rPr>
+              <a:t>Lookup Root Word in Word Group Dictionary</a:t>
+            </a:r>
+          </a:p>
+          <a:p>
+            <a:pPr marL="971550" lvl="1" indent="-514350">
+              <a:buFont typeface="+mj-lt"/>
+              <a:buAutoNum type="arabicPeriod"/>
+            </a:pPr>
+            <a:r>
+              <a:rPr lang="en-US" sz="2800" dirty="0" smtClean="0">
+                <a:solidFill>
+                  <a:srgbClr val="0070C0"/>
+                </a:solidFill>
+              </a:rPr>
+              <a:t>If entry exists, replace with common root word for</a:t>
+            </a:r>
+          </a:p>
+          <a:p>
+            <a:pPr lvl="1"/>
+            <a:r>
+              <a:rPr lang="en-US" sz="2800" dirty="0">
+                <a:solidFill>
+                  <a:srgbClr val="0070C0"/>
+                </a:solidFill>
+              </a:rPr>
+              <a:t> </a:t>
+            </a:r>
+            <a:r>
+              <a:rPr lang="en-US" sz="2800" dirty="0" smtClean="0">
+                <a:solidFill>
+                  <a:srgbClr val="0070C0"/>
+                </a:solidFill>
+              </a:rPr>
+              <a:t>      the group.</a:t>
+            </a:r>
+            <a:endParaRPr lang="en-US" sz="2800" dirty="0">
+              <a:solidFill>
+                <a:schemeClr val="accent6">
+                  <a:lumMod val="50000"/>
+                </a:schemeClr>
+              </a:solidFill>
+            </a:endParaRPr>
+          </a:p>
+          <a:p>
+            <a:pPr lvl="1"/>
             <a:endParaRPr lang="en-US" sz="2800" dirty="0" smtClean="0">
               <a:solidFill>
                 <a:schemeClr val="accent6">
@@ -8418,105 +8530,7 @@
             </a:endParaRPr>
           </a:p>
           <a:p>
-            <a:pPr marL="342900" indent="-342900">
-              <a:buFont typeface="Arial" panose="020B0604020202020204" pitchFamily="34" charset="0"/>
-              <a:buChar char="•"/>
-            </a:pPr>
-            <a:r>
-              <a:rPr lang="en-US" sz="2800" dirty="0" smtClean="0">
-                <a:solidFill>
-                  <a:schemeClr val="accent6">
-                    <a:lumMod val="50000"/>
-                  </a:schemeClr>
-                </a:solidFill>
-              </a:rPr>
-              <a:t>N-grams	(2 word pairs, 3 word pairs, …)</a:t>
-            </a:r>
-          </a:p>
-          <a:p>
-            <a:endParaRPr lang="en-US" sz="2800" dirty="0" smtClean="0">
-              <a:solidFill>
-                <a:schemeClr val="accent6">
-                  <a:lumMod val="50000"/>
-                </a:schemeClr>
-              </a:solidFill>
-            </a:endParaRPr>
-          </a:p>
-          <a:p>
-            <a:pPr marL="342900" indent="-342900">
-              <a:buFont typeface="Arial" panose="020B0604020202020204" pitchFamily="34" charset="0"/>
-              <a:buChar char="•"/>
-            </a:pPr>
-            <a:r>
-              <a:rPr lang="en-US" sz="2800" dirty="0" smtClean="0">
-                <a:solidFill>
-                  <a:schemeClr val="accent6">
-                    <a:lumMod val="50000"/>
-                  </a:schemeClr>
-                </a:solidFill>
-              </a:rPr>
-              <a:t>Word-Vectors</a:t>
-            </a:r>
-          </a:p>
-          <a:p>
-            <a:pPr marL="342900" indent="-342900">
-              <a:buFont typeface="Arial" panose="020B0604020202020204" pitchFamily="34" charset="0"/>
-              <a:buChar char="•"/>
-            </a:pPr>
-            <a:endParaRPr lang="en-US" sz="2800" dirty="0" smtClean="0">
-              <a:solidFill>
-                <a:schemeClr val="accent6">
-                  <a:lumMod val="50000"/>
-                </a:schemeClr>
-              </a:solidFill>
-            </a:endParaRPr>
-          </a:p>
-          <a:p>
-            <a:pPr marL="342900" indent="-342900">
-              <a:buFont typeface="Arial" panose="020B0604020202020204" pitchFamily="34" charset="0"/>
-              <a:buChar char="•"/>
-            </a:pPr>
-            <a:r>
-              <a:rPr lang="en-US" sz="2800" dirty="0" smtClean="0">
-                <a:solidFill>
-                  <a:schemeClr val="accent6">
-                    <a:lumMod val="50000"/>
-                  </a:schemeClr>
-                </a:solidFill>
-              </a:rPr>
-              <a:t>Correcting Misspellings</a:t>
-            </a:r>
-          </a:p>
-          <a:p>
-            <a:pPr marL="342900" indent="-342900">
-              <a:buFont typeface="Arial" panose="020B0604020202020204" pitchFamily="34" charset="0"/>
-              <a:buChar char="•"/>
-            </a:pPr>
-            <a:endParaRPr lang="en-US" sz="2800" dirty="0" smtClean="0">
-              <a:solidFill>
-                <a:schemeClr val="accent6">
-                  <a:lumMod val="50000"/>
-                </a:schemeClr>
-              </a:solidFill>
-            </a:endParaRPr>
-          </a:p>
-          <a:p>
-            <a:pPr marL="342900" indent="-342900">
-              <a:buFont typeface="Arial" panose="020B0604020202020204" pitchFamily="34" charset="0"/>
-              <a:buChar char="•"/>
-            </a:pPr>
-            <a:r>
-              <a:rPr lang="en-US" sz="2800" dirty="0" smtClean="0">
-                <a:solidFill>
-                  <a:schemeClr val="accent6">
-                    <a:lumMod val="50000"/>
-                  </a:schemeClr>
-                </a:solidFill>
-              </a:rPr>
-              <a:t>Detecting incorrectly categorized Narratives.</a:t>
-            </a:r>
-          </a:p>
-          <a:p>
+            <a:pPr lvl="1"/>
             <a:endParaRPr lang="en-US" sz="2800" dirty="0">
               <a:solidFill>
                 <a:schemeClr val="accent6">
@@ -8524,6 +8538,21 @@
                 </a:schemeClr>
               </a:solidFill>
             </a:endParaRPr>
+          </a:p>
+          <a:p>
+            <a:r>
+              <a:rPr lang="en-US" sz="2800" dirty="0" smtClean="0">
+                <a:solidFill>
+                  <a:srgbClr val="0070C0"/>
+                </a:solidFill>
+              </a:rPr>
+              <a:t>Group Example: </a:t>
+            </a:r>
+            <a:r>
+              <a:rPr lang="en-US" sz="2800" dirty="0" smtClean="0"/>
+              <a:t>male: [ man, gentleman, boy, guy, dude ]</a:t>
+            </a:r>
+            <a:endParaRPr lang="en-US" sz="2800" dirty="0"/>
           </a:p>
         </p:txBody>
       </p:sp>
@@ -8577,7 +8606,7 @@
         <p:spPr>
           <a:xfrm>
             <a:off x="457200" y="274638"/>
-            <a:ext cx="7848600" cy="792162"/>
+            <a:ext cx="8305800" cy="792162"/>
           </a:xfrm>
         </p:spPr>
         <p:txBody>
@@ -8595,7 +8624,7 @@
                   </a:schemeClr>
                 </a:solidFill>
               </a:rPr>
-              <a:t>Final – Homegrown Tool</a:t>
+              <a:t>Advance Topic – Word Reduction</a:t>
             </a:r>
             <a:endParaRPr lang="en-US" dirty="0">
               <a:solidFill>
@@ -8644,13 +8673,7 @@
             <a:pPr marL="0" indent="0">
               <a:buNone/>
             </a:pPr>
-            <a:endParaRPr lang="en-US" dirty="0" smtClean="0"/>
-          </a:p>
-          <a:p>
-            <a:pPr marL="0" indent="0">
-              <a:buNone/>
-            </a:pPr>
-            <a:endParaRPr lang="en-US" dirty="0"/>
+            <a:endParaRPr lang="en-US" sz="2400" dirty="0" smtClean="0"/>
           </a:p>
         </p:txBody>
       </p:sp>
@@ -8687,14 +8710,14 @@
       </p:cxnSp>
       <p:sp>
         <p:nvSpPr>
-          <p:cNvPr id="7" name="TextBox 6"/>
+          <p:cNvPr id="4" name="TextBox 3"/>
           <p:cNvSpPr txBox="1"/>
           <p:nvPr/>
         </p:nvSpPr>
         <p:spPr>
           <a:xfrm>
-            <a:off x="457200" y="1447797"/>
-            <a:ext cx="8092665" cy="2677656"/>
+            <a:off x="1066800" y="1219200"/>
+            <a:ext cx="6833666" cy="1200329"/>
           </a:xfrm>
           <a:prstGeom prst="rect">
             <a:avLst/>
@@ -8707,96 +8730,376 @@
           </a:bodyPr>
           <a:lstStyle/>
           <a:p>
-            <a:pPr marL="342900" indent="-342900">
-              <a:buFont typeface="Arial" panose="020B0604020202020204" pitchFamily="34" charset="0"/>
-              <a:buChar char="•"/>
-            </a:pPr>
-            <a:r>
-              <a:rPr lang="en-US" sz="2800" dirty="0" smtClean="0">
-                <a:solidFill>
-                  <a:srgbClr val="0070C0"/>
-                </a:solidFill>
-              </a:rPr>
-              <a:t>I built a command tool for doing all the steps in this </a:t>
-            </a:r>
-          </a:p>
-          <a:p>
-            <a:r>
-              <a:rPr lang="en-US" sz="2800" dirty="0">
-                <a:solidFill>
-                  <a:srgbClr val="0070C0"/>
-                </a:solidFill>
-              </a:rPr>
-              <a:t> </a:t>
-            </a:r>
-            <a:r>
-              <a:rPr lang="en-US" sz="2800" dirty="0" smtClean="0">
-                <a:solidFill>
-                  <a:srgbClr val="0070C0"/>
-                </a:solidFill>
-              </a:rPr>
-              <a:t>   presentation.</a:t>
-            </a:r>
-          </a:p>
-          <a:p>
-            <a:pPr marL="342900" indent="-342900">
-              <a:buFont typeface="Arial" panose="020B0604020202020204" pitchFamily="34" charset="0"/>
-              <a:buChar char="•"/>
-            </a:pPr>
-            <a:endParaRPr lang="en-US" sz="2800" dirty="0">
-              <a:solidFill>
-                <a:schemeClr val="accent6">
-                  <a:lumMod val="50000"/>
-                </a:schemeClr>
-              </a:solidFill>
-            </a:endParaRPr>
-          </a:p>
-          <a:p>
-            <a:pPr marL="1257300" lvl="2" indent="-342900">
-              <a:buFont typeface="Arial" panose="020B0604020202020204" pitchFamily="34" charset="0"/>
-              <a:buChar char="•"/>
-            </a:pPr>
-            <a:r>
-              <a:rPr lang="en-US" sz="2800" dirty="0" smtClean="0">
-                <a:solidFill>
-                  <a:schemeClr val="accent6">
-                    <a:lumMod val="50000"/>
-                  </a:schemeClr>
-                </a:solidFill>
-              </a:rPr>
-              <a:t>Java based, packaged as a JAR file.</a:t>
-            </a:r>
-          </a:p>
-          <a:p>
-            <a:endParaRPr lang="en-US" sz="2800" dirty="0" smtClean="0">
-              <a:solidFill>
-                <a:schemeClr val="accent6">
-                  <a:lumMod val="50000"/>
-                </a:schemeClr>
-              </a:solidFill>
-            </a:endParaRPr>
-          </a:p>
-          <a:p>
-            <a:endParaRPr lang="en-US" sz="2800" dirty="0">
-              <a:solidFill>
-                <a:schemeClr val="accent6">
-                  <a:lumMod val="50000"/>
-                </a:schemeClr>
-              </a:solidFill>
-            </a:endParaRPr>
-          </a:p>
-        </p:txBody>
-      </p:sp>
-      <p:sp>
-        <p:nvSpPr>
-          <p:cNvPr id="6" name="TextBox 5"/>
+            <a:r>
+              <a:rPr lang="en-US" sz="2400" dirty="0" smtClean="0"/>
+              <a:t>male   : </a:t>
+            </a:r>
+            <a:r>
+              <a:rPr lang="en-US" sz="2400" dirty="0"/>
+              <a:t>[ man, gentleman, boy, guy, dude </a:t>
+            </a:r>
+            <a:r>
+              <a:rPr lang="en-US" sz="2400" dirty="0" smtClean="0"/>
+              <a:t>]</a:t>
+            </a:r>
+          </a:p>
+          <a:p>
+            <a:r>
+              <a:rPr lang="en-US" sz="2400" dirty="0" smtClean="0"/>
+              <a:t>female: [ woman, lady, girl, gal ]</a:t>
+            </a:r>
+          </a:p>
+          <a:p>
+            <a:r>
+              <a:rPr lang="en-US" sz="2400" dirty="0" smtClean="0"/>
+              <a:t>parent : [ father, mother, mom, mommy, dad, daddy ]</a:t>
+            </a:r>
+            <a:endParaRPr lang="en-US" sz="2400" dirty="0"/>
+          </a:p>
+        </p:txBody>
+      </p:sp>
+      <p:graphicFrame>
+        <p:nvGraphicFramePr>
+          <p:cNvPr id="6" name="Table 5"/>
+          <p:cNvGraphicFramePr>
+            <a:graphicFrameLocks noGrp="1"/>
+          </p:cNvGraphicFramePr>
+          <p:nvPr>
+            <p:extLst>
+              <p:ext uri="{D42A27DB-BD31-4B8C-83A1-F6EECF244321}">
+                <p14:modId xmlns:p14="http://schemas.microsoft.com/office/powerpoint/2010/main" val="1514375655"/>
+              </p:ext>
+            </p:extLst>
+          </p:nvPr>
+        </p:nvGraphicFramePr>
+        <p:xfrm>
+          <a:off x="533400" y="2667000"/>
+          <a:ext cx="2895600" cy="3642360"/>
+        </p:xfrm>
+        <a:graphic>
+          <a:graphicData uri="http://schemas.openxmlformats.org/drawingml/2006/table">
+            <a:tbl>
+              <a:tblPr firstRow="1" bandRow="1">
+                <a:tableStyleId>{5C22544A-7EE6-4342-B048-85BDC9FD1C3A}</a:tableStyleId>
+              </a:tblPr>
+              <a:tblGrid>
+                <a:gridCol w="1524000"/>
+                <a:gridCol w="1371600"/>
+              </a:tblGrid>
+              <a:tr h="228600">
+                <a:tc>
+                  <a:txBody>
+                    <a:bodyPr/>
+                    <a:lstStyle/>
+                    <a:p>
+                      <a:r>
+                        <a:rPr lang="en-US" sz="1400" dirty="0" smtClean="0"/>
+                        <a:t>Word</a:t>
+                      </a:r>
+                      <a:endParaRPr lang="en-US" sz="1400" dirty="0"/>
+                    </a:p>
+                  </a:txBody>
+                  <a:tcPr/>
+                </a:tc>
+                <a:tc>
+                  <a:txBody>
+                    <a:bodyPr/>
+                    <a:lstStyle/>
+                    <a:p>
+                      <a:r>
+                        <a:rPr lang="en-US" sz="1400" dirty="0" smtClean="0"/>
+                        <a:t>Root</a:t>
+                      </a:r>
+                      <a:endParaRPr lang="en-US" sz="1400" dirty="0"/>
+                    </a:p>
+                  </a:txBody>
+                  <a:tcPr/>
+                </a:tc>
+              </a:tr>
+              <a:tr h="370840">
+                <a:tc>
+                  <a:txBody>
+                    <a:bodyPr/>
+                    <a:lstStyle/>
+                    <a:p>
+                      <a:r>
+                        <a:rPr lang="en-US" sz="1400" dirty="0" smtClean="0"/>
+                        <a:t>man</a:t>
+                      </a:r>
+                      <a:endParaRPr lang="en-US" sz="1400" dirty="0"/>
+                    </a:p>
+                  </a:txBody>
+                  <a:tcPr/>
+                </a:tc>
+                <a:tc>
+                  <a:txBody>
+                    <a:bodyPr/>
+                    <a:lstStyle/>
+                    <a:p>
+                      <a:r>
+                        <a:rPr lang="en-US" sz="1400" dirty="0" smtClean="0"/>
+                        <a:t>male</a:t>
+                      </a:r>
+                      <a:endParaRPr lang="en-US" sz="1400" dirty="0"/>
+                    </a:p>
+                  </a:txBody>
+                  <a:tcPr/>
+                </a:tc>
+              </a:tr>
+              <a:tr h="370840">
+                <a:tc>
+                  <a:txBody>
+                    <a:bodyPr/>
+                    <a:lstStyle/>
+                    <a:p>
+                      <a:r>
+                        <a:rPr lang="en-US" sz="1400" dirty="0" smtClean="0"/>
+                        <a:t>gentleman</a:t>
+                      </a:r>
+                      <a:endParaRPr lang="en-US" sz="1400" dirty="0"/>
+                    </a:p>
+                  </a:txBody>
+                  <a:tcPr/>
+                </a:tc>
+                <a:tc>
+                  <a:txBody>
+                    <a:bodyPr/>
+                    <a:lstStyle/>
+                    <a:p>
+                      <a:r>
+                        <a:rPr lang="en-US" sz="1400" dirty="0" smtClean="0"/>
+                        <a:t>male</a:t>
+                      </a:r>
+                      <a:endParaRPr lang="en-US" sz="1400" dirty="0"/>
+                    </a:p>
+                  </a:txBody>
+                  <a:tcPr/>
+                </a:tc>
+              </a:tr>
+              <a:tr h="370840">
+                <a:tc>
+                  <a:txBody>
+                    <a:bodyPr/>
+                    <a:lstStyle/>
+                    <a:p>
+                      <a:r>
+                        <a:rPr lang="en-US" sz="1400" dirty="0" smtClean="0"/>
+                        <a:t>boy</a:t>
+                      </a:r>
+                      <a:endParaRPr lang="en-US" sz="1400" dirty="0"/>
+                    </a:p>
+                  </a:txBody>
+                  <a:tcPr/>
+                </a:tc>
+                <a:tc>
+                  <a:txBody>
+                    <a:bodyPr/>
+                    <a:lstStyle/>
+                    <a:p>
+                      <a:r>
+                        <a:rPr lang="en-US" sz="1400" dirty="0" smtClean="0"/>
+                        <a:t>male</a:t>
+                      </a:r>
+                      <a:endParaRPr lang="en-US" sz="1400" dirty="0"/>
+                    </a:p>
+                  </a:txBody>
+                  <a:tcPr/>
+                </a:tc>
+              </a:tr>
+              <a:tr h="370840">
+                <a:tc>
+                  <a:txBody>
+                    <a:bodyPr/>
+                    <a:lstStyle/>
+                    <a:p>
+                      <a:r>
+                        <a:rPr lang="en-US" sz="1400" dirty="0" smtClean="0"/>
+                        <a:t>guy</a:t>
+                      </a:r>
+                      <a:endParaRPr lang="en-US" sz="1400" dirty="0"/>
+                    </a:p>
+                  </a:txBody>
+                  <a:tcPr/>
+                </a:tc>
+                <a:tc>
+                  <a:txBody>
+                    <a:bodyPr/>
+                    <a:lstStyle/>
+                    <a:p>
+                      <a:r>
+                        <a:rPr lang="en-US" sz="1400" dirty="0" smtClean="0"/>
+                        <a:t>male</a:t>
+                      </a:r>
+                      <a:endParaRPr lang="en-US" sz="1400" dirty="0"/>
+                    </a:p>
+                  </a:txBody>
+                  <a:tcPr/>
+                </a:tc>
+              </a:tr>
+              <a:tr h="370840">
+                <a:tc>
+                  <a:txBody>
+                    <a:bodyPr/>
+                    <a:lstStyle/>
+                    <a:p>
+                      <a:r>
+                        <a:rPr lang="en-US" sz="1400" dirty="0" smtClean="0"/>
+                        <a:t>dude</a:t>
+                      </a:r>
+                      <a:endParaRPr lang="en-US" sz="1400" dirty="0"/>
+                    </a:p>
+                  </a:txBody>
+                  <a:tcPr/>
+                </a:tc>
+                <a:tc>
+                  <a:txBody>
+                    <a:bodyPr/>
+                    <a:lstStyle/>
+                    <a:p>
+                      <a:r>
+                        <a:rPr lang="en-US" sz="1400" dirty="0" smtClean="0"/>
+                        <a:t>male</a:t>
+                      </a:r>
+                      <a:endParaRPr lang="en-US" sz="1400" dirty="0"/>
+                    </a:p>
+                  </a:txBody>
+                  <a:tcPr/>
+                </a:tc>
+              </a:tr>
+              <a:tr h="370840">
+                <a:tc>
+                  <a:txBody>
+                    <a:bodyPr/>
+                    <a:lstStyle/>
+                    <a:p>
+                      <a:r>
+                        <a:rPr lang="en-US" sz="1400" dirty="0" smtClean="0"/>
+                        <a:t>woman</a:t>
+                      </a:r>
+                      <a:endParaRPr lang="en-US" sz="1400" dirty="0"/>
+                    </a:p>
+                  </a:txBody>
+                  <a:tcPr/>
+                </a:tc>
+                <a:tc>
+                  <a:txBody>
+                    <a:bodyPr/>
+                    <a:lstStyle/>
+                    <a:p>
+                      <a:r>
+                        <a:rPr lang="en-US" sz="1400" dirty="0" smtClean="0"/>
+                        <a:t>female</a:t>
+                      </a:r>
+                      <a:endParaRPr lang="en-US" sz="1400" dirty="0"/>
+                    </a:p>
+                  </a:txBody>
+                  <a:tcPr/>
+                </a:tc>
+              </a:tr>
+              <a:tr h="370840">
+                <a:tc>
+                  <a:txBody>
+                    <a:bodyPr/>
+                    <a:lstStyle/>
+                    <a:p>
+                      <a:r>
+                        <a:rPr lang="en-US" sz="1400" dirty="0" smtClean="0"/>
+                        <a:t>Lady</a:t>
+                      </a:r>
+                      <a:endParaRPr lang="en-US" sz="1400" dirty="0"/>
+                    </a:p>
+                  </a:txBody>
+                  <a:tcPr/>
+                </a:tc>
+                <a:tc>
+                  <a:txBody>
+                    <a:bodyPr/>
+                    <a:lstStyle/>
+                    <a:p>
+                      <a:r>
+                        <a:rPr lang="en-US" sz="1400" dirty="0" smtClean="0"/>
+                        <a:t>Female</a:t>
+                      </a:r>
+                      <a:endParaRPr lang="en-US" sz="1400" dirty="0"/>
+                    </a:p>
+                  </a:txBody>
+                  <a:tcPr/>
+                </a:tc>
+              </a:tr>
+              <a:tr h="370840">
+                <a:tc>
+                  <a:txBody>
+                    <a:bodyPr/>
+                    <a:lstStyle/>
+                    <a:p>
+                      <a:r>
+                        <a:rPr lang="en-US" sz="1400" dirty="0" smtClean="0"/>
+                        <a:t>girl</a:t>
+                      </a:r>
+                      <a:endParaRPr lang="en-US" sz="1400" dirty="0"/>
+                    </a:p>
+                  </a:txBody>
+                  <a:tcPr/>
+                </a:tc>
+                <a:tc>
+                  <a:txBody>
+                    <a:bodyPr/>
+                    <a:lstStyle/>
+                    <a:p>
+                      <a:r>
+                        <a:rPr lang="en-US" sz="1400" dirty="0" smtClean="0"/>
+                        <a:t>female</a:t>
+                      </a:r>
+                      <a:endParaRPr lang="en-US" sz="1400" dirty="0"/>
+                    </a:p>
+                  </a:txBody>
+                  <a:tcPr/>
+                </a:tc>
+              </a:tr>
+              <a:tr h="370840">
+                <a:tc>
+                  <a:txBody>
+                    <a:bodyPr/>
+                    <a:lstStyle/>
+                    <a:p>
+                      <a:r>
+                        <a:rPr lang="en-US" sz="1400" dirty="0" smtClean="0"/>
+                        <a:t>gal</a:t>
+                      </a:r>
+                      <a:endParaRPr lang="en-US" sz="1400" dirty="0"/>
+                    </a:p>
+                  </a:txBody>
+                  <a:tcPr/>
+                </a:tc>
+                <a:tc>
+                  <a:txBody>
+                    <a:bodyPr/>
+                    <a:lstStyle/>
+                    <a:p>
+                      <a:r>
+                        <a:rPr lang="en-US" sz="1400" dirty="0" smtClean="0"/>
+                        <a:t>female</a:t>
+                      </a:r>
+                      <a:endParaRPr lang="en-US" sz="1400" dirty="0"/>
+                    </a:p>
+                  </a:txBody>
+                  <a:tcPr/>
+                </a:tc>
+              </a:tr>
+            </a:tbl>
+          </a:graphicData>
+        </a:graphic>
+      </p:graphicFrame>
+      <p:sp>
+        <p:nvSpPr>
+          <p:cNvPr id="8" name="TextBox 7"/>
           <p:cNvSpPr txBox="1"/>
           <p:nvPr/>
         </p:nvSpPr>
         <p:spPr>
           <a:xfrm>
-            <a:off x="228600" y="3956176"/>
-            <a:ext cx="8240910" cy="338554"/>
+            <a:off x="3810000" y="2953266"/>
+            <a:ext cx="5322098" cy="646331"/>
           </a:xfrm>
           <a:prstGeom prst="rect">
             <a:avLst/>
@@ -8810,19 +9113,186 @@
           <a:lstStyle/>
           <a:p>
             <a:r>
-              <a:rPr lang="en-US" sz="1600" dirty="0">
-                <a:hlinkClick r:id="rId2"/>
-              </a:rPr>
-              <a:t>https://github.com/andrewferlitsch/Portland-Data-Science-Group/blob/master/README.NLP.md</a:t>
-            </a:r>
-            <a:endParaRPr lang="en-US" sz="1600" dirty="0"/>
-          </a:p>
-        </p:txBody>
-      </p:sp>
+              <a:rPr lang="en-US" dirty="0" smtClean="0"/>
+              <a:t>The mother played with the girls while the dad </a:t>
+            </a:r>
+          </a:p>
+          <a:p>
+            <a:r>
+              <a:rPr lang="en-US" dirty="0" smtClean="0"/>
+              <a:t>prepared snacks for the ladies in mom’s reading group.</a:t>
+            </a:r>
+            <a:endParaRPr lang="en-US" dirty="0"/>
+          </a:p>
+        </p:txBody>
+      </p:sp>
+      <p:sp>
+        <p:nvSpPr>
+          <p:cNvPr id="9" name="TextBox 8"/>
+          <p:cNvSpPr txBox="1"/>
+          <p:nvPr/>
+        </p:nvSpPr>
+        <p:spPr>
+          <a:xfrm>
+            <a:off x="5715000" y="3810000"/>
+            <a:ext cx="1034642" cy="2862322"/>
+          </a:xfrm>
+          <a:prstGeom prst="rect">
+            <a:avLst/>
+          </a:prstGeom>
+          <a:noFill/>
+        </p:spPr>
+        <p:txBody>
+          <a:bodyPr wrap="none" rtlCol="0">
+            <a:spAutoFit/>
+          </a:bodyPr>
+          <a:lstStyle/>
+          <a:p>
+            <a:r>
+              <a:rPr lang="en-US" dirty="0" smtClean="0"/>
+              <a:t>parent, </a:t>
+            </a:r>
+            <a:br>
+              <a:rPr lang="en-US" dirty="0" smtClean="0"/>
+            </a:br>
+            <a:r>
+              <a:rPr lang="en-US" dirty="0" smtClean="0"/>
+              <a:t>play, </a:t>
+            </a:r>
+            <a:br>
+              <a:rPr lang="en-US" dirty="0" smtClean="0"/>
+            </a:br>
+            <a:r>
+              <a:rPr lang="en-US" dirty="0" smtClean="0"/>
+              <a:t>female, </a:t>
+            </a:r>
+            <a:br>
+              <a:rPr lang="en-US" dirty="0" smtClean="0"/>
+            </a:br>
+            <a:r>
+              <a:rPr lang="en-US" dirty="0" smtClean="0"/>
+              <a:t>parent, </a:t>
+            </a:r>
+            <a:br>
+              <a:rPr lang="en-US" dirty="0" smtClean="0"/>
+            </a:br>
+            <a:r>
+              <a:rPr lang="en-US" dirty="0" smtClean="0"/>
+              <a:t>prepare, </a:t>
+            </a:r>
+            <a:br>
+              <a:rPr lang="en-US" dirty="0" smtClean="0"/>
+            </a:br>
+            <a:r>
+              <a:rPr lang="en-US" dirty="0" smtClean="0"/>
+              <a:t>snack, </a:t>
+            </a:r>
+            <a:br>
+              <a:rPr lang="en-US" dirty="0" smtClean="0"/>
+            </a:br>
+            <a:r>
+              <a:rPr lang="en-US" dirty="0" smtClean="0"/>
+              <a:t>female,</a:t>
+            </a:r>
+          </a:p>
+          <a:p>
+            <a:r>
+              <a:rPr lang="en-US" dirty="0" smtClean="0"/>
+              <a:t>parent, </a:t>
+            </a:r>
+            <a:br>
+              <a:rPr lang="en-US" dirty="0" smtClean="0"/>
+            </a:br>
+            <a:r>
+              <a:rPr lang="en-US" dirty="0" smtClean="0"/>
+              <a:t>read, </a:t>
+            </a:r>
+            <a:br>
+              <a:rPr lang="en-US" dirty="0" smtClean="0"/>
+            </a:br>
+            <a:r>
+              <a:rPr lang="en-US" dirty="0" smtClean="0"/>
+              <a:t>group</a:t>
+            </a:r>
+            <a:endParaRPr lang="en-US" dirty="0"/>
+          </a:p>
+        </p:txBody>
+      </p:sp>
+      <p:cxnSp>
+        <p:nvCxnSpPr>
+          <p:cNvPr id="15" name="Straight Connector 14"/>
+          <p:cNvCxnSpPr/>
+          <p:nvPr/>
+        </p:nvCxnSpPr>
+        <p:spPr>
+          <a:xfrm>
+            <a:off x="4483633" y="3599597"/>
+            <a:ext cx="0" cy="1048603"/>
+          </a:xfrm>
+          <a:prstGeom prst="line">
+            <a:avLst/>
+          </a:prstGeom>
+          <a:ln w="19050">
+            <a:solidFill>
+              <a:schemeClr val="tx1"/>
+            </a:solidFill>
+          </a:ln>
+        </p:spPr>
+        <p:style>
+          <a:lnRef idx="1">
+            <a:schemeClr val="accent1"/>
+          </a:lnRef>
+          <a:fillRef idx="0">
+            <a:schemeClr val="accent1"/>
+          </a:fillRef>
+          <a:effectRef idx="0">
+            <a:schemeClr val="accent1"/>
+          </a:effectRef>
+          <a:fontRef idx="minor">
+            <a:schemeClr val="tx1"/>
+          </a:fontRef>
+        </p:style>
+      </p:cxnSp>
+      <p:cxnSp>
+        <p:nvCxnSpPr>
+          <p:cNvPr id="17" name="Straight Arrow Connector 16"/>
+          <p:cNvCxnSpPr/>
+          <p:nvPr/>
+        </p:nvCxnSpPr>
+        <p:spPr>
+          <a:xfrm>
+            <a:off x="4483633" y="4648200"/>
+            <a:ext cx="926567" cy="0"/>
+          </a:xfrm>
+          <a:prstGeom prst="straightConnector1">
+            <a:avLst/>
+          </a:prstGeom>
+          <a:ln w="19050">
+            <a:solidFill>
+              <a:schemeClr val="tx1"/>
+            </a:solidFill>
+            <a:tailEnd type="arrow"/>
+          </a:ln>
+        </p:spPr>
+        <p:style>
+          <a:lnRef idx="1">
+            <a:schemeClr val="accent1"/>
+          </a:lnRef>
+          <a:fillRef idx="0">
+            <a:schemeClr val="accent1"/>
+          </a:fillRef>
+          <a:effectRef idx="0">
+            <a:schemeClr val="accent1"/>
+          </a:effectRef>
+          <a:fontRef idx="minor">
+            <a:schemeClr val="tx1"/>
+          </a:fontRef>
+        </p:style>
+      </p:cxnSp>
     </p:spTree>
     <p:extLst>
       <p:ext uri="{BB962C8B-B14F-4D97-AF65-F5344CB8AC3E}">
-        <p14:creationId xmlns:p14="http://schemas.microsoft.com/office/powerpoint/2010/main" val="4234244601"/>
+        <p14:creationId xmlns:p14="http://schemas.microsoft.com/office/powerpoint/2010/main" val="4246488997"/>
       </p:ext>
     </p:extLst>
   </p:cSld>
@@ -9705,7 +10175,7 @@
         </p:spPr>
         <p:txBody>
           <a:bodyPr>
-            <a:normAutofit fontScale="90000"/>
+            <a:normAutofit/>
           </a:bodyPr>
           <a:lstStyle/>
           <a:p>
@@ -9718,17 +10188,7 @@
                   </a:schemeClr>
                 </a:solidFill>
               </a:rPr>
-              <a:t>Final – Homegrown </a:t>
-            </a:r>
-            <a:r>
-              <a:rPr lang="en-US" dirty="0" smtClean="0">
-                <a:solidFill>
-                  <a:schemeClr val="accent1">
-                    <a:lumMod val="75000"/>
-                  </a:schemeClr>
-                </a:solidFill>
-              </a:rPr>
-              <a:t>Tool - Examples</a:t>
+              <a:t>Advance Topics – N-grams</a:t>
             </a:r>
             <a:endParaRPr lang="en-US" dirty="0">
               <a:solidFill>
@@ -9826,8 +10286,8 @@
         </p:nvSpPr>
         <p:spPr>
           <a:xfrm>
-            <a:off x="609600" y="1066800"/>
-            <a:ext cx="7924800" cy="5570756"/>
+            <a:off x="457200" y="1447797"/>
+            <a:ext cx="8595943" cy="3539430"/>
           </a:xfrm>
           <a:prstGeom prst="rect">
             <a:avLst/>
@@ -9835,6 +10295,915 @@
           <a:noFill/>
         </p:spPr>
         <p:txBody>
+          <a:bodyPr wrap="none" rtlCol="0">
+            <a:spAutoFit/>
+          </a:bodyPr>
+          <a:lstStyle/>
+          <a:p>
+            <a:pPr marL="342900" indent="-342900">
+              <a:buFont typeface="Arial" panose="020B0604020202020204" pitchFamily="34" charset="0"/>
+              <a:buChar char="•"/>
+            </a:pPr>
+            <a:r>
+              <a:rPr lang="en-US" sz="2800" dirty="0" smtClean="0">
+                <a:solidFill>
+                  <a:schemeClr val="accent6">
+                    <a:lumMod val="50000"/>
+                  </a:schemeClr>
+                </a:solidFill>
+              </a:rPr>
+              <a:t>Instead of parsing the sentence into single words, each</a:t>
+            </a:r>
+          </a:p>
+          <a:p>
+            <a:r>
+              <a:rPr lang="en-US" sz="2800" dirty="0">
+                <a:solidFill>
+                  <a:schemeClr val="accent6">
+                    <a:lumMod val="50000"/>
+                  </a:schemeClr>
+                </a:solidFill>
+              </a:rPr>
+              <a:t> </a:t>
+            </a:r>
+            <a:r>
+              <a:rPr lang="en-US" sz="2800" dirty="0" smtClean="0">
+                <a:solidFill>
+                  <a:schemeClr val="accent6">
+                    <a:lumMod val="50000"/>
+                  </a:schemeClr>
+                </a:solidFill>
+              </a:rPr>
+              <a:t>   as a feature, we group them in pairs (2-gram) or triplets</a:t>
+            </a:r>
+            <a:br>
+              <a:rPr lang="en-US" sz="2800" dirty="0" smtClean="0">
+                <a:solidFill>
+                  <a:schemeClr val="accent6">
+                    <a:lumMod val="50000"/>
+                  </a:schemeClr>
+                </a:solidFill>
+              </a:rPr>
+            </a:br>
+            <a:r>
+              <a:rPr lang="en-US" sz="2800" dirty="0" smtClean="0">
+                <a:solidFill>
+                  <a:schemeClr val="accent6">
+                    <a:lumMod val="50000"/>
+                  </a:schemeClr>
+                </a:solidFill>
+              </a:rPr>
+              <a:t>    (3-grams), </a:t>
+            </a:r>
+            <a:r>
+              <a:rPr lang="en-US" sz="2800" dirty="0" err="1" smtClean="0">
+                <a:solidFill>
+                  <a:schemeClr val="accent6">
+                    <a:lumMod val="50000"/>
+                  </a:schemeClr>
+                </a:solidFill>
+              </a:rPr>
+              <a:t>etc</a:t>
+            </a:r>
+            <a:r>
+              <a:rPr lang="en-US" sz="2800" dirty="0" smtClean="0">
+                <a:solidFill>
+                  <a:schemeClr val="accent6">
+                    <a:lumMod val="50000"/>
+                  </a:schemeClr>
+                </a:solidFill>
+              </a:rPr>
+              <a:t>, ….</a:t>
+            </a:r>
+            <a:endParaRPr lang="en-US" sz="2800" dirty="0" smtClean="0">
+              <a:solidFill>
+                <a:schemeClr val="accent6">
+                  <a:lumMod val="50000"/>
+                </a:schemeClr>
+              </a:solidFill>
+            </a:endParaRPr>
+          </a:p>
+          <a:p>
+            <a:pPr marL="342900" indent="-342900">
+              <a:buFont typeface="Arial" panose="020B0604020202020204" pitchFamily="34" charset="0"/>
+              <a:buChar char="•"/>
+            </a:pPr>
+            <a:endParaRPr lang="en-US" sz="2800" dirty="0">
+              <a:solidFill>
+                <a:schemeClr val="accent6">
+                  <a:lumMod val="50000"/>
+                </a:schemeClr>
+              </a:solidFill>
+            </a:endParaRPr>
+          </a:p>
+          <a:p>
+            <a:pPr marL="342900" indent="-342900">
+              <a:buFont typeface="Arial" panose="020B0604020202020204" pitchFamily="34" charset="0"/>
+              <a:buChar char="•"/>
+            </a:pPr>
+            <a:endParaRPr lang="en-US" sz="2800" dirty="0" smtClean="0">
+              <a:solidFill>
+                <a:schemeClr val="accent6">
+                  <a:lumMod val="50000"/>
+                </a:schemeClr>
+              </a:solidFill>
+            </a:endParaRPr>
+          </a:p>
+          <a:p>
+            <a:r>
+              <a:rPr lang="en-US" sz="2800" dirty="0" smtClean="0"/>
+              <a:t> Sentence after stop word removal and lemma [ TODO ]</a:t>
+            </a:r>
+          </a:p>
+          <a:p>
+            <a:r>
+              <a:rPr lang="en-US" sz="2800" dirty="0" smtClean="0"/>
+              <a:t>[ quick, brown, fox, jump, lazy, dog ]</a:t>
+            </a:r>
+            <a:endParaRPr lang="en-US" sz="2800" dirty="0" smtClean="0">
+              <a:solidFill>
+                <a:schemeClr val="accent6">
+                  <a:lumMod val="50000"/>
+                </a:schemeClr>
+              </a:solidFill>
+            </a:endParaRPr>
+          </a:p>
+          <a:p>
+            <a:endParaRPr lang="en-US" sz="2800" dirty="0">
+              <a:solidFill>
+                <a:schemeClr val="accent6">
+                  <a:lumMod val="50000"/>
+                </a:schemeClr>
+              </a:solidFill>
+            </a:endParaRPr>
+          </a:p>
+        </p:txBody>
+      </p:sp>
+    </p:spTree>
+    <p:extLst>
+      <p:ext uri="{BB962C8B-B14F-4D97-AF65-F5344CB8AC3E}">
+        <p14:creationId xmlns:p14="http://schemas.microsoft.com/office/powerpoint/2010/main" val="3985561866"/>
+      </p:ext>
+    </p:extLst>
+  </p:cSld>
+  <p:clrMapOvr>
+    <a:masterClrMapping/>
+  </p:clrMapOvr>
+  <p:timing>
+    <p:tnLst>
+      <p:par>
+        <p:cTn id="1" dur="indefinite" restart="never" nodeType="tmRoot"/>
+      </p:par>
+    </p:tnLst>
+  </p:timing>
+</p:sld>
+</file>
+
+<file path=ppt/slides/slide21.xml><?xml version="1.0" encoding="utf-8"?>
+<p:sld xmlns:a="http://schemas.openxmlformats.org/drawingml/2006/main" xmlns:r="http://schemas.openxmlformats.org/officeDocument/2006/relationships" xmlns:p="http://schemas.openxmlformats.org/presentationml/2006/main">
+  <p:cSld>
+    <p:spTree>
+      <p:nvGrpSpPr>
+        <p:cNvPr id="1" name=""/>
+        <p:cNvGrpSpPr/>
+        <p:nvPr/>
+      </p:nvGrpSpPr>
+      <p:grpSpPr>
+        <a:xfrm>
+          <a:off x="0" y="0"/>
+          <a:ext cx="0" cy="0"/>
+          <a:chOff x="0" y="0"/>
+          <a:chExt cx="0" cy="0"/>
+        </a:xfrm>
+      </p:grpSpPr>
+      <p:sp>
+        <p:nvSpPr>
+          <p:cNvPr id="2" name="Title 1"/>
+          <p:cNvSpPr>
+            <a:spLocks noGrp="1"/>
+          </p:cNvSpPr>
+          <p:nvPr>
+            <p:ph type="title"/>
+          </p:nvPr>
+        </p:nvSpPr>
+        <p:spPr>
+          <a:xfrm>
+            <a:off x="457200" y="274638"/>
+            <a:ext cx="7848600" cy="792162"/>
+          </a:xfrm>
+        </p:spPr>
+        <p:txBody>
+          <a:bodyPr>
+            <a:normAutofit/>
+          </a:bodyPr>
+          <a:lstStyle/>
+          <a:p>
+            <a:pPr algn="l"/>
+            <a:r>
+              <a:rPr lang="en-US" dirty="0" smtClean="0">
+                <a:solidFill>
+                  <a:schemeClr val="accent1">
+                    <a:lumMod val="75000"/>
+                  </a:schemeClr>
+                </a:solidFill>
+              </a:rPr>
+              <a:t>More – Not Covered</a:t>
+            </a:r>
+            <a:endParaRPr lang="en-US" dirty="0">
+              <a:solidFill>
+                <a:schemeClr val="accent1">
+                  <a:lumMod val="75000"/>
+                </a:schemeClr>
+              </a:solidFill>
+            </a:endParaRPr>
+          </a:p>
+        </p:txBody>
+      </p:sp>
+      <p:sp>
+        <p:nvSpPr>
+          <p:cNvPr id="3" name="Content Placeholder 2"/>
+          <p:cNvSpPr>
+            <a:spLocks noGrp="1"/>
+          </p:cNvSpPr>
+          <p:nvPr>
+            <p:ph idx="1"/>
+          </p:nvPr>
+        </p:nvSpPr>
+        <p:spPr>
+          <a:xfrm>
+            <a:off x="304800" y="1219201"/>
+            <a:ext cx="8229600" cy="3733800"/>
+          </a:xfrm>
+        </p:spPr>
+        <p:txBody>
+          <a:bodyPr>
+            <a:normAutofit/>
+          </a:bodyPr>
+          <a:lstStyle/>
+          <a:p>
+            <a:pPr marL="0" indent="0">
+              <a:buNone/>
+            </a:pPr>
+            <a:endParaRPr lang="en-US" dirty="0" smtClean="0"/>
+          </a:p>
+          <a:p>
+            <a:pPr marL="0" indent="0">
+              <a:buNone/>
+            </a:pPr>
+            <a:endParaRPr lang="en-US" dirty="0" smtClean="0"/>
+          </a:p>
+          <a:p>
+            <a:pPr marL="0" indent="0">
+              <a:buNone/>
+            </a:pPr>
+            <a:endParaRPr lang="en-US" dirty="0" smtClean="0"/>
+          </a:p>
+          <a:p>
+            <a:pPr marL="0" indent="0">
+              <a:buNone/>
+            </a:pPr>
+            <a:endParaRPr lang="en-US" dirty="0"/>
+          </a:p>
+        </p:txBody>
+      </p:sp>
+      <p:cxnSp>
+        <p:nvCxnSpPr>
+          <p:cNvPr id="5" name="Straight Connector 4"/>
+          <p:cNvCxnSpPr/>
+          <p:nvPr/>
+        </p:nvCxnSpPr>
+        <p:spPr>
+          <a:xfrm>
+            <a:off x="0" y="990600"/>
+            <a:ext cx="9144000" cy="0"/>
+          </a:xfrm>
+          <a:prstGeom prst="line">
+            <a:avLst/>
+          </a:prstGeom>
+          <a:ln w="19050"/>
+        </p:spPr>
+        <p:style>
+          <a:lnRef idx="1">
+            <a:schemeClr val="accent1"/>
+          </a:lnRef>
+          <a:fillRef idx="0">
+            <a:schemeClr val="accent1"/>
+          </a:fillRef>
+          <a:effectRef idx="0">
+            <a:schemeClr val="accent1"/>
+          </a:effectRef>
+          <a:fontRef idx="minor">
+            <a:schemeClr val="tx1"/>
+          </a:fontRef>
+        </p:style>
+      </p:cxnSp>
+      <p:sp>
+        <p:nvSpPr>
+          <p:cNvPr id="7" name="TextBox 6"/>
+          <p:cNvSpPr txBox="1"/>
+          <p:nvPr/>
+        </p:nvSpPr>
+        <p:spPr>
+          <a:xfrm>
+            <a:off x="457200" y="1447797"/>
+            <a:ext cx="6987554" cy="3970318"/>
+          </a:xfrm>
+          <a:prstGeom prst="rect">
+            <a:avLst/>
+          </a:prstGeom>
+          <a:noFill/>
+        </p:spPr>
+        <p:txBody>
+          <a:bodyPr wrap="none" rtlCol="0">
+            <a:spAutoFit/>
+          </a:bodyPr>
+          <a:lstStyle/>
+          <a:p>
+            <a:endParaRPr lang="en-US" sz="2800" dirty="0" smtClean="0">
+              <a:solidFill>
+                <a:schemeClr val="accent6">
+                  <a:lumMod val="50000"/>
+                </a:schemeClr>
+              </a:solidFill>
+            </a:endParaRPr>
+          </a:p>
+          <a:p>
+            <a:pPr marL="342900" indent="-342900">
+              <a:buFont typeface="Arial" panose="020B0604020202020204" pitchFamily="34" charset="0"/>
+              <a:buChar char="•"/>
+            </a:pPr>
+            <a:r>
+              <a:rPr lang="en-US" sz="2800" dirty="0" smtClean="0">
+                <a:solidFill>
+                  <a:schemeClr val="accent6">
+                    <a:lumMod val="50000"/>
+                  </a:schemeClr>
+                </a:solidFill>
+              </a:rPr>
+              <a:t>N-grams	(2 word pairs, 3 word pairs, …)</a:t>
+            </a:r>
+          </a:p>
+          <a:p>
+            <a:endParaRPr lang="en-US" sz="2800" dirty="0" smtClean="0">
+              <a:solidFill>
+                <a:schemeClr val="accent6">
+                  <a:lumMod val="50000"/>
+                </a:schemeClr>
+              </a:solidFill>
+            </a:endParaRPr>
+          </a:p>
+          <a:p>
+            <a:pPr marL="342900" indent="-342900">
+              <a:buFont typeface="Arial" panose="020B0604020202020204" pitchFamily="34" charset="0"/>
+              <a:buChar char="•"/>
+            </a:pPr>
+            <a:r>
+              <a:rPr lang="en-US" sz="2800" dirty="0" smtClean="0">
+                <a:solidFill>
+                  <a:schemeClr val="accent6">
+                    <a:lumMod val="50000"/>
+                  </a:schemeClr>
+                </a:solidFill>
+              </a:rPr>
+              <a:t>Word-Vectors</a:t>
+            </a:r>
+          </a:p>
+          <a:p>
+            <a:pPr marL="342900" indent="-342900">
+              <a:buFont typeface="Arial" panose="020B0604020202020204" pitchFamily="34" charset="0"/>
+              <a:buChar char="•"/>
+            </a:pPr>
+            <a:endParaRPr lang="en-US" sz="2800" dirty="0" smtClean="0">
+              <a:solidFill>
+                <a:schemeClr val="accent6">
+                  <a:lumMod val="50000"/>
+                </a:schemeClr>
+              </a:solidFill>
+            </a:endParaRPr>
+          </a:p>
+          <a:p>
+            <a:pPr marL="342900" indent="-342900">
+              <a:buFont typeface="Arial" panose="020B0604020202020204" pitchFamily="34" charset="0"/>
+              <a:buChar char="•"/>
+            </a:pPr>
+            <a:r>
+              <a:rPr lang="en-US" sz="2800" dirty="0" smtClean="0">
+                <a:solidFill>
+                  <a:schemeClr val="accent6">
+                    <a:lumMod val="50000"/>
+                  </a:schemeClr>
+                </a:solidFill>
+              </a:rPr>
+              <a:t>Correcting Misspellings</a:t>
+            </a:r>
+          </a:p>
+          <a:p>
+            <a:pPr marL="342900" indent="-342900">
+              <a:buFont typeface="Arial" panose="020B0604020202020204" pitchFamily="34" charset="0"/>
+              <a:buChar char="•"/>
+            </a:pPr>
+            <a:endParaRPr lang="en-US" sz="2800" dirty="0" smtClean="0">
+              <a:solidFill>
+                <a:schemeClr val="accent6">
+                  <a:lumMod val="50000"/>
+                </a:schemeClr>
+              </a:solidFill>
+            </a:endParaRPr>
+          </a:p>
+          <a:p>
+            <a:pPr marL="342900" indent="-342900">
+              <a:buFont typeface="Arial" panose="020B0604020202020204" pitchFamily="34" charset="0"/>
+              <a:buChar char="•"/>
+            </a:pPr>
+            <a:r>
+              <a:rPr lang="en-US" sz="2800" dirty="0" smtClean="0">
+                <a:solidFill>
+                  <a:schemeClr val="accent6">
+                    <a:lumMod val="50000"/>
+                  </a:schemeClr>
+                </a:solidFill>
+              </a:rPr>
+              <a:t>Detecting incorrectly categorized Narratives.</a:t>
+            </a:r>
+          </a:p>
+          <a:p>
+            <a:endParaRPr lang="en-US" sz="2800" dirty="0">
+              <a:solidFill>
+                <a:schemeClr val="accent6">
+                  <a:lumMod val="50000"/>
+                </a:schemeClr>
+              </a:solidFill>
+            </a:endParaRPr>
+          </a:p>
+        </p:txBody>
+      </p:sp>
+    </p:spTree>
+    <p:extLst>
+      <p:ext uri="{BB962C8B-B14F-4D97-AF65-F5344CB8AC3E}">
+        <p14:creationId xmlns:p14="http://schemas.microsoft.com/office/powerpoint/2010/main" val="306392594"/>
+      </p:ext>
+    </p:extLst>
+  </p:cSld>
+  <p:clrMapOvr>
+    <a:masterClrMapping/>
+  </p:clrMapOvr>
+  <p:timing>
+    <p:tnLst>
+      <p:par>
+        <p:cTn id="1" dur="indefinite" restart="never" nodeType="tmRoot"/>
+      </p:par>
+    </p:tnLst>
+  </p:timing>
+</p:sld>
+</file>
+
+<file path=ppt/slides/slide22.xml><?xml version="1.0" encoding="utf-8"?>
+<p:sld xmlns:a="http://schemas.openxmlformats.org/drawingml/2006/main" xmlns:r="http://schemas.openxmlformats.org/officeDocument/2006/relationships" xmlns:p="http://schemas.openxmlformats.org/presentationml/2006/main">
+  <p:cSld>
+    <p:spTree>
+      <p:nvGrpSpPr>
+        <p:cNvPr id="1" name=""/>
+        <p:cNvGrpSpPr/>
+        <p:nvPr/>
+      </p:nvGrpSpPr>
+      <p:grpSpPr>
+        <a:xfrm>
+          <a:off x="0" y="0"/>
+          <a:ext cx="0" cy="0"/>
+          <a:chOff x="0" y="0"/>
+          <a:chExt cx="0" cy="0"/>
+        </a:xfrm>
+      </p:grpSpPr>
+      <p:sp>
+        <p:nvSpPr>
+          <p:cNvPr id="2" name="Title 1"/>
+          <p:cNvSpPr>
+            <a:spLocks noGrp="1"/>
+          </p:cNvSpPr>
+          <p:nvPr>
+            <p:ph type="title"/>
+          </p:nvPr>
+        </p:nvSpPr>
+        <p:spPr>
+          <a:xfrm>
+            <a:off x="457200" y="274638"/>
+            <a:ext cx="7848600" cy="792162"/>
+          </a:xfrm>
+        </p:spPr>
+        <p:txBody>
+          <a:bodyPr>
+            <a:normAutofit/>
+          </a:bodyPr>
+          <a:lstStyle/>
+          <a:p>
+            <a:pPr algn="l"/>
+            <a:r>
+              <a:rPr lang="en-US" dirty="0" smtClean="0">
+                <a:solidFill>
+                  <a:schemeClr val="accent1">
+                    <a:lumMod val="75000"/>
+                  </a:schemeClr>
+                </a:solidFill>
+              </a:rPr>
+              <a:t>Final – Homegrown Tool</a:t>
+            </a:r>
+            <a:endParaRPr lang="en-US" dirty="0">
+              <a:solidFill>
+                <a:schemeClr val="accent1">
+                  <a:lumMod val="75000"/>
+                </a:schemeClr>
+              </a:solidFill>
+            </a:endParaRPr>
+          </a:p>
+        </p:txBody>
+      </p:sp>
+      <p:sp>
+        <p:nvSpPr>
+          <p:cNvPr id="3" name="Content Placeholder 2"/>
+          <p:cNvSpPr>
+            <a:spLocks noGrp="1"/>
+          </p:cNvSpPr>
+          <p:nvPr>
+            <p:ph idx="1"/>
+          </p:nvPr>
+        </p:nvSpPr>
+        <p:spPr>
+          <a:xfrm>
+            <a:off x="304800" y="1219201"/>
+            <a:ext cx="8229600" cy="3733800"/>
+          </a:xfrm>
+        </p:spPr>
+        <p:txBody>
+          <a:bodyPr>
+            <a:normAutofit/>
+          </a:bodyPr>
+          <a:lstStyle/>
+          <a:p>
+            <a:pPr marL="0" indent="0">
+              <a:buNone/>
+            </a:pPr>
+            <a:endParaRPr lang="en-US" dirty="0" smtClean="0"/>
+          </a:p>
+          <a:p>
+            <a:pPr marL="0" indent="0">
+              <a:buNone/>
+            </a:pPr>
+            <a:endParaRPr lang="en-US" dirty="0" smtClean="0"/>
+          </a:p>
+          <a:p>
+            <a:pPr marL="0" indent="0">
+              <a:buNone/>
+            </a:pPr>
+            <a:endParaRPr lang="en-US" dirty="0" smtClean="0"/>
+          </a:p>
+          <a:p>
+            <a:pPr marL="0" indent="0">
+              <a:buNone/>
+            </a:pPr>
+            <a:endParaRPr lang="en-US" dirty="0"/>
+          </a:p>
+        </p:txBody>
+      </p:sp>
+      <p:cxnSp>
+        <p:nvCxnSpPr>
+          <p:cNvPr id="5" name="Straight Connector 4"/>
+          <p:cNvCxnSpPr/>
+          <p:nvPr/>
+        </p:nvCxnSpPr>
+        <p:spPr>
+          <a:xfrm>
+            <a:off x="0" y="990600"/>
+            <a:ext cx="9144000" cy="0"/>
+          </a:xfrm>
+          <a:prstGeom prst="line">
+            <a:avLst/>
+          </a:prstGeom>
+          <a:ln w="19050"/>
+        </p:spPr>
+        <p:style>
+          <a:lnRef idx="1">
+            <a:schemeClr val="accent1"/>
+          </a:lnRef>
+          <a:fillRef idx="0">
+            <a:schemeClr val="accent1"/>
+          </a:fillRef>
+          <a:effectRef idx="0">
+            <a:schemeClr val="accent1"/>
+          </a:effectRef>
+          <a:fontRef idx="minor">
+            <a:schemeClr val="tx1"/>
+          </a:fontRef>
+        </p:style>
+      </p:cxnSp>
+      <p:sp>
+        <p:nvSpPr>
+          <p:cNvPr id="7" name="TextBox 6"/>
+          <p:cNvSpPr txBox="1"/>
+          <p:nvPr/>
+        </p:nvSpPr>
+        <p:spPr>
+          <a:xfrm>
+            <a:off x="457200" y="1447797"/>
+            <a:ext cx="8092665" cy="2677656"/>
+          </a:xfrm>
+          <a:prstGeom prst="rect">
+            <a:avLst/>
+          </a:prstGeom>
+          <a:noFill/>
+        </p:spPr>
+        <p:txBody>
+          <a:bodyPr wrap="none" rtlCol="0">
+            <a:spAutoFit/>
+          </a:bodyPr>
+          <a:lstStyle/>
+          <a:p>
+            <a:pPr marL="342900" indent="-342900">
+              <a:buFont typeface="Arial" panose="020B0604020202020204" pitchFamily="34" charset="0"/>
+              <a:buChar char="•"/>
+            </a:pPr>
+            <a:r>
+              <a:rPr lang="en-US" sz="2800" dirty="0" smtClean="0">
+                <a:solidFill>
+                  <a:srgbClr val="0070C0"/>
+                </a:solidFill>
+              </a:rPr>
+              <a:t>I built a command tool for doing all the steps in this </a:t>
+            </a:r>
+          </a:p>
+          <a:p>
+            <a:r>
+              <a:rPr lang="en-US" sz="2800" dirty="0">
+                <a:solidFill>
+                  <a:srgbClr val="0070C0"/>
+                </a:solidFill>
+              </a:rPr>
+              <a:t> </a:t>
+            </a:r>
+            <a:r>
+              <a:rPr lang="en-US" sz="2800" dirty="0" smtClean="0">
+                <a:solidFill>
+                  <a:srgbClr val="0070C0"/>
+                </a:solidFill>
+              </a:rPr>
+              <a:t>   presentation.</a:t>
+            </a:r>
+          </a:p>
+          <a:p>
+            <a:pPr marL="342900" indent="-342900">
+              <a:buFont typeface="Arial" panose="020B0604020202020204" pitchFamily="34" charset="0"/>
+              <a:buChar char="•"/>
+            </a:pPr>
+            <a:endParaRPr lang="en-US" sz="2800" dirty="0">
+              <a:solidFill>
+                <a:schemeClr val="accent6">
+                  <a:lumMod val="50000"/>
+                </a:schemeClr>
+              </a:solidFill>
+            </a:endParaRPr>
+          </a:p>
+          <a:p>
+            <a:pPr marL="1257300" lvl="2" indent="-342900">
+              <a:buFont typeface="Arial" panose="020B0604020202020204" pitchFamily="34" charset="0"/>
+              <a:buChar char="•"/>
+            </a:pPr>
+            <a:r>
+              <a:rPr lang="en-US" sz="2800" dirty="0" smtClean="0">
+                <a:solidFill>
+                  <a:schemeClr val="accent6">
+                    <a:lumMod val="50000"/>
+                  </a:schemeClr>
+                </a:solidFill>
+              </a:rPr>
+              <a:t>Java based, packaged as a JAR file.</a:t>
+            </a:r>
+          </a:p>
+          <a:p>
+            <a:endParaRPr lang="en-US" sz="2800" dirty="0" smtClean="0">
+              <a:solidFill>
+                <a:schemeClr val="accent6">
+                  <a:lumMod val="50000"/>
+                </a:schemeClr>
+              </a:solidFill>
+            </a:endParaRPr>
+          </a:p>
+          <a:p>
+            <a:endParaRPr lang="en-US" sz="2800" dirty="0">
+              <a:solidFill>
+                <a:schemeClr val="accent6">
+                  <a:lumMod val="50000"/>
+                </a:schemeClr>
+              </a:solidFill>
+            </a:endParaRPr>
+          </a:p>
+        </p:txBody>
+      </p:sp>
+      <p:sp>
+        <p:nvSpPr>
+          <p:cNvPr id="6" name="TextBox 5"/>
+          <p:cNvSpPr txBox="1"/>
+          <p:nvPr/>
+        </p:nvSpPr>
+        <p:spPr>
+          <a:xfrm>
+            <a:off x="228600" y="3956176"/>
+            <a:ext cx="8240910" cy="338554"/>
+          </a:xfrm>
+          <a:prstGeom prst="rect">
+            <a:avLst/>
+          </a:prstGeom>
+          <a:noFill/>
+        </p:spPr>
+        <p:txBody>
+          <a:bodyPr wrap="none" rtlCol="0">
+            <a:spAutoFit/>
+          </a:bodyPr>
+          <a:lstStyle/>
+          <a:p>
+            <a:r>
+              <a:rPr lang="en-US" sz="1600" dirty="0">
+                <a:hlinkClick r:id="rId2"/>
+              </a:rPr>
+              <a:t>https://github.com/andrewferlitsch/Portland-Data-Science-Group/blob/master/README.NLP.md</a:t>
+            </a:r>
+            <a:endParaRPr lang="en-US" sz="1600" dirty="0"/>
+          </a:p>
+        </p:txBody>
+      </p:sp>
+    </p:spTree>
+    <p:extLst>
+      <p:ext uri="{BB962C8B-B14F-4D97-AF65-F5344CB8AC3E}">
+        <p14:creationId xmlns:p14="http://schemas.microsoft.com/office/powerpoint/2010/main" val="4234244601"/>
+      </p:ext>
+    </p:extLst>
+  </p:cSld>
+  <p:clrMapOvr>
+    <a:masterClrMapping/>
+  </p:clrMapOvr>
+  <p:timing>
+    <p:tnLst>
+      <p:par>
+        <p:cTn id="1" dur="indefinite" restart="never" nodeType="tmRoot"/>
+      </p:par>
+    </p:tnLst>
+  </p:timing>
+</p:sld>
+</file>
+
+<file path=ppt/slides/slide23.xml><?xml version="1.0" encoding="utf-8"?>
+<p:sld xmlns:a="http://schemas.openxmlformats.org/drawingml/2006/main" xmlns:r="http://schemas.openxmlformats.org/officeDocument/2006/relationships" xmlns:p="http://schemas.openxmlformats.org/presentationml/2006/main">
+  <p:cSld>
+    <p:spTree>
+      <p:nvGrpSpPr>
+        <p:cNvPr id="1" name=""/>
+        <p:cNvGrpSpPr/>
+        <p:nvPr/>
+      </p:nvGrpSpPr>
+      <p:grpSpPr>
+        <a:xfrm>
+          <a:off x="0" y="0"/>
+          <a:ext cx="0" cy="0"/>
+          <a:chOff x="0" y="0"/>
+          <a:chExt cx="0" cy="0"/>
+        </a:xfrm>
+      </p:grpSpPr>
+      <p:sp>
+        <p:nvSpPr>
+          <p:cNvPr id="2" name="Title 1"/>
+          <p:cNvSpPr>
+            <a:spLocks noGrp="1"/>
+          </p:cNvSpPr>
+          <p:nvPr>
+            <p:ph type="title"/>
+          </p:nvPr>
+        </p:nvSpPr>
+        <p:spPr>
+          <a:xfrm>
+            <a:off x="457200" y="274638"/>
+            <a:ext cx="7848600" cy="792162"/>
+          </a:xfrm>
+        </p:spPr>
+        <p:txBody>
+          <a:bodyPr>
+            <a:normAutofit fontScale="90000"/>
+          </a:bodyPr>
+          <a:lstStyle/>
+          <a:p>
+            <a:pPr algn="l"/>
+            <a:r>
+              <a:rPr lang="en-US" dirty="0" smtClean="0">
+                <a:solidFill>
+                  <a:schemeClr val="accent1">
+                    <a:lumMod val="75000"/>
+                  </a:schemeClr>
+                </a:solidFill>
+              </a:rPr>
+              <a:t>Final – Homegrown Tool - Examples</a:t>
+            </a:r>
+            <a:endParaRPr lang="en-US" dirty="0">
+              <a:solidFill>
+                <a:schemeClr val="accent1">
+                  <a:lumMod val="75000"/>
+                </a:schemeClr>
+              </a:solidFill>
+            </a:endParaRPr>
+          </a:p>
+        </p:txBody>
+      </p:sp>
+      <p:sp>
+        <p:nvSpPr>
+          <p:cNvPr id="3" name="Content Placeholder 2"/>
+          <p:cNvSpPr>
+            <a:spLocks noGrp="1"/>
+          </p:cNvSpPr>
+          <p:nvPr>
+            <p:ph idx="1"/>
+          </p:nvPr>
+        </p:nvSpPr>
+        <p:spPr>
+          <a:xfrm>
+            <a:off x="304800" y="1219201"/>
+            <a:ext cx="8229600" cy="3733800"/>
+          </a:xfrm>
+        </p:spPr>
+        <p:txBody>
+          <a:bodyPr>
+            <a:normAutofit/>
+          </a:bodyPr>
+          <a:lstStyle/>
+          <a:p>
+            <a:pPr marL="0" indent="0">
+              <a:buNone/>
+            </a:pPr>
+            <a:endParaRPr lang="en-US" dirty="0" smtClean="0"/>
+          </a:p>
+          <a:p>
+            <a:pPr marL="0" indent="0">
+              <a:buNone/>
+            </a:pPr>
+            <a:endParaRPr lang="en-US" dirty="0" smtClean="0"/>
+          </a:p>
+          <a:p>
+            <a:pPr marL="0" indent="0">
+              <a:buNone/>
+            </a:pPr>
+            <a:endParaRPr lang="en-US" dirty="0" smtClean="0"/>
+          </a:p>
+          <a:p>
+            <a:pPr marL="0" indent="0">
+              <a:buNone/>
+            </a:pPr>
+            <a:endParaRPr lang="en-US" dirty="0"/>
+          </a:p>
+        </p:txBody>
+      </p:sp>
+      <p:cxnSp>
+        <p:nvCxnSpPr>
+          <p:cNvPr id="5" name="Straight Connector 4"/>
+          <p:cNvCxnSpPr/>
+          <p:nvPr/>
+        </p:nvCxnSpPr>
+        <p:spPr>
+          <a:xfrm>
+            <a:off x="0" y="990600"/>
+            <a:ext cx="9144000" cy="0"/>
+          </a:xfrm>
+          <a:prstGeom prst="line">
+            <a:avLst/>
+          </a:prstGeom>
+          <a:ln w="19050"/>
+        </p:spPr>
+        <p:style>
+          <a:lnRef idx="1">
+            <a:schemeClr val="accent1"/>
+          </a:lnRef>
+          <a:fillRef idx="0">
+            <a:schemeClr val="accent1"/>
+          </a:fillRef>
+          <a:effectRef idx="0">
+            <a:schemeClr val="accent1"/>
+          </a:effectRef>
+          <a:fontRef idx="minor">
+            <a:schemeClr val="tx1"/>
+          </a:fontRef>
+        </p:style>
+      </p:cxnSp>
+      <p:sp>
+        <p:nvSpPr>
+          <p:cNvPr id="7" name="TextBox 6"/>
+          <p:cNvSpPr txBox="1"/>
+          <p:nvPr/>
+        </p:nvSpPr>
+        <p:spPr>
+          <a:xfrm>
+            <a:off x="609600" y="1066800"/>
+            <a:ext cx="7924800" cy="5570756"/>
+          </a:xfrm>
+          <a:prstGeom prst="rect">
+            <a:avLst/>
+          </a:prstGeom>
+          <a:noFill/>
+        </p:spPr>
+        <p:txBody>
           <a:bodyPr wrap="square" rtlCol="0">
             <a:spAutoFit/>
           </a:bodyPr>
@@ -9860,11 +11229,6 @@
               </a:rPr>
               <a:t> question pairs (training set: 400,000)</a:t>
             </a:r>
-            <a:endParaRPr lang="en-US" sz="2400" dirty="0" smtClean="0">
-              <a:solidFill>
-                <a:srgbClr val="0070C0"/>
-              </a:solidFill>
-            </a:endParaRPr>
           </a:p>
           <a:p>
             <a:pPr lvl="1"/>

</xml_diff>

<commit_message>
add n-grams to prez
</commit_message>
<xml_diff>
--- a/Presentations/NLP - Narrative.pptx
+++ b/Presentations/NLP - Narrative.pptx
@@ -25,9 +25,10 @@
     <p:sldId id="274" r:id="rId19"/>
     <p:sldId id="279" r:id="rId20"/>
     <p:sldId id="278" r:id="rId21"/>
-    <p:sldId id="277" r:id="rId22"/>
-    <p:sldId id="275" r:id="rId23"/>
-    <p:sldId id="276" r:id="rId24"/>
+    <p:sldId id="280" r:id="rId22"/>
+    <p:sldId id="277" r:id="rId23"/>
+    <p:sldId id="275" r:id="rId24"/>
+    <p:sldId id="276" r:id="rId25"/>
   </p:sldIdLst>
   <p:sldSz cx="9144000" cy="6858000" type="screen4x3"/>
   <p:notesSz cx="6858000" cy="9144000"/>
@@ -10287,7 +10288,7 @@
         <p:spPr>
           <a:xfrm>
             <a:off x="457200" y="1447797"/>
-            <a:ext cx="8595943" cy="3539430"/>
+            <a:ext cx="8595943" cy="5324535"/>
           </a:xfrm>
           <a:prstGeom prst="rect">
             <a:avLst/>
@@ -10307,9 +10308,7 @@
             <a:r>
               <a:rPr lang="en-US" sz="2800" dirty="0" smtClean="0">
                 <a:solidFill>
-                  <a:schemeClr val="accent6">
-                    <a:lumMod val="50000"/>
-                  </a:schemeClr>
+                  <a:srgbClr val="0070C0"/>
                 </a:solidFill>
               </a:rPr>
               <a:t>Instead of parsing the sentence into single words, each</a:t>
@@ -10319,9 +10318,7 @@
             <a:r>
               <a:rPr lang="en-US" sz="2800" dirty="0">
                 <a:solidFill>
-                  <a:schemeClr val="accent6">
-                    <a:lumMod val="50000"/>
-                  </a:schemeClr>
+                  <a:srgbClr val="0070C0"/>
                 </a:solidFill>
               </a:rPr>
               <a:t> </a:t>
@@ -10329,9 +10326,7 @@
             <a:r>
               <a:rPr lang="en-US" sz="2800" dirty="0" smtClean="0">
                 <a:solidFill>
-                  <a:schemeClr val="accent6">
-                    <a:lumMod val="50000"/>
-                  </a:schemeClr>
+                  <a:srgbClr val="0070C0"/>
                 </a:solidFill>
               </a:rPr>
               <a:t>   as a feature, we group them in pairs (2-gram) or triplets</a:t>
@@ -10339,18 +10334,14 @@
             <a:br>
               <a:rPr lang="en-US" sz="2800" dirty="0" smtClean="0">
                 <a:solidFill>
-                  <a:schemeClr val="accent6">
-                    <a:lumMod val="50000"/>
-                  </a:schemeClr>
+                  <a:srgbClr val="0070C0"/>
                 </a:solidFill>
               </a:rPr>
             </a:br>
             <a:r>
               <a:rPr lang="en-US" sz="2800" dirty="0" smtClean="0">
                 <a:solidFill>
-                  <a:schemeClr val="accent6">
-                    <a:lumMod val="50000"/>
-                  </a:schemeClr>
+                  <a:srgbClr val="0070C0"/>
                 </a:solidFill>
               </a:rPr>
               <a:t>    (3-grams), </a:t>
@@ -10358,9 +10349,7 @@
             <a:r>
               <a:rPr lang="en-US" sz="2800" dirty="0" err="1" smtClean="0">
                 <a:solidFill>
-                  <a:schemeClr val="accent6">
-                    <a:lumMod val="50000"/>
-                  </a:schemeClr>
+                  <a:srgbClr val="0070C0"/>
                 </a:solidFill>
               </a:rPr>
               <a:t>etc</a:t>
@@ -10368,26 +10357,21 @@
             <a:r>
               <a:rPr lang="en-US" sz="2800" dirty="0" smtClean="0">
                 <a:solidFill>
-                  <a:schemeClr val="accent6">
-                    <a:lumMod val="50000"/>
-                  </a:schemeClr>
+                  <a:srgbClr val="0070C0"/>
                 </a:solidFill>
               </a:rPr>
-              <a:t>, ….</a:t>
-            </a:r>
-            <a:endParaRPr lang="en-US" sz="2800" dirty="0" smtClean="0">
-              <a:solidFill>
-                <a:schemeClr val="accent6">
-                  <a:lumMod val="50000"/>
-                </a:schemeClr>
-              </a:solidFill>
-            </a:endParaRPr>
-          </a:p>
-          <a:p>
-            <a:pPr marL="342900" indent="-342900">
-              <a:buFont typeface="Arial" panose="020B0604020202020204" pitchFamily="34" charset="0"/>
-              <a:buChar char="•"/>
-            </a:pPr>
+              <a:t>, </a:t>
+            </a:r>
+            <a:r>
+              <a:rPr lang="en-US" sz="2800" dirty="0" smtClean="0">
+                <a:solidFill>
+                  <a:srgbClr val="0070C0"/>
+                </a:solidFill>
+              </a:rPr>
+              <a:t>….</a:t>
+            </a:r>
+          </a:p>
+          <a:p>
             <a:endParaRPr lang="en-US" sz="2800" dirty="0">
               <a:solidFill>
                 <a:schemeClr val="accent6">
@@ -10397,11 +10381,138 @@
             </a:endParaRPr>
           </a:p>
           <a:p>
-            <a:pPr marL="342900" indent="-342900">
+            <a:pPr marL="457200" indent="-457200">
               <a:buFont typeface="Arial" panose="020B0604020202020204" pitchFamily="34" charset="0"/>
               <a:buChar char="•"/>
             </a:pPr>
-            <a:endParaRPr lang="en-US" sz="2800" dirty="0" smtClean="0">
+            <a:r>
+              <a:rPr lang="en-US" sz="2800" dirty="0" smtClean="0">
+                <a:solidFill>
+                  <a:srgbClr val="0070C0"/>
+                </a:solidFill>
+              </a:rPr>
+              <a:t>Parameters:</a:t>
+            </a:r>
+          </a:p>
+          <a:p>
+            <a:pPr marL="971550" lvl="1" indent="-514350">
+              <a:buFont typeface="+mj-lt"/>
+              <a:buAutoNum type="arabicPeriod"/>
+            </a:pPr>
+            <a:r>
+              <a:rPr lang="en-US" sz="2800" dirty="0" smtClean="0">
+                <a:solidFill>
+                  <a:srgbClr val="0070C0"/>
+                </a:solidFill>
+              </a:rPr>
+              <a:t>Choose Window Size (2, 3, …)</a:t>
+            </a:r>
+          </a:p>
+          <a:p>
+            <a:pPr marL="971550" lvl="1" indent="-514350">
+              <a:buFont typeface="+mj-lt"/>
+              <a:buAutoNum type="arabicPeriod"/>
+            </a:pPr>
+            <a:r>
+              <a:rPr lang="en-US" sz="2800" dirty="0" smtClean="0">
+                <a:solidFill>
+                  <a:srgbClr val="0070C0"/>
+                </a:solidFill>
+              </a:rPr>
+              <a:t>Choose Stride Length (1, 2, …)</a:t>
+            </a:r>
+          </a:p>
+          <a:p>
+            <a:pPr marL="971550" lvl="1" indent="-514350">
+              <a:buFont typeface="+mj-lt"/>
+              <a:buAutoNum type="arabicPeriod"/>
+            </a:pPr>
+            <a:endParaRPr lang="en-US" sz="2400" dirty="0">
+              <a:solidFill>
+                <a:srgbClr val="0070C0"/>
+              </a:solidFill>
+            </a:endParaRPr>
+          </a:p>
+          <a:p>
+            <a:pPr lvl="1"/>
+            <a:r>
+              <a:rPr lang="en-US" sz="2400" dirty="0" smtClean="0"/>
+              <a:t>		</a:t>
+            </a:r>
+            <a:r>
+              <a:rPr lang="en-US" sz="2000" dirty="0" smtClean="0"/>
+              <a:t>         </a:t>
+            </a:r>
+            <a:r>
+              <a:rPr lang="en-US" sz="2000" dirty="0" smtClean="0">
+                <a:solidFill>
+                  <a:schemeClr val="accent6">
+                    <a:lumMod val="50000"/>
+                  </a:schemeClr>
+                </a:solidFill>
+              </a:rPr>
+              <a:t>2-gram</a:t>
+            </a:r>
+            <a:r>
+              <a:rPr lang="en-US" sz="2000" dirty="0" smtClean="0"/>
+              <a:t/>
+            </a:r>
+            <a:br>
+              <a:rPr lang="en-US" sz="2000" dirty="0" smtClean="0"/>
+            </a:br>
+            <a:r>
+              <a:rPr lang="en-US" sz="2400" dirty="0" smtClean="0"/>
+              <a:t/>
+            </a:r>
+            <a:br>
+              <a:rPr lang="en-US" sz="2400" dirty="0" smtClean="0"/>
+            </a:br>
+            <a:r>
+              <a:rPr lang="en-US" sz="2400" dirty="0" smtClean="0"/>
+              <a:t>		word1 </a:t>
+            </a:r>
+            <a:r>
+              <a:rPr lang="en-US" sz="2400" dirty="0"/>
+              <a:t>word2 word3 … </a:t>
+            </a:r>
+            <a:r>
+              <a:rPr lang="en-US" sz="2400" dirty="0" smtClean="0"/>
+              <a:t>word4</a:t>
+            </a:r>
+            <a:endParaRPr lang="en-US" sz="1400" dirty="0" smtClean="0"/>
+          </a:p>
+          <a:p>
+            <a:pPr lvl="1"/>
+            <a:r>
+              <a:rPr lang="en-US" sz="1400" dirty="0"/>
+              <a:t> </a:t>
+            </a:r>
+            <a:r>
+              <a:rPr lang="en-US" sz="1400" dirty="0" smtClean="0"/>
+              <a:t>        </a:t>
+            </a:r>
+            <a:br>
+              <a:rPr lang="en-US" sz="1400" dirty="0" smtClean="0"/>
+            </a:br>
+            <a:r>
+              <a:rPr lang="en-US" sz="1400" dirty="0" smtClean="0"/>
+              <a:t>                 </a:t>
+            </a:r>
+            <a:r>
+              <a:rPr lang="en-US" sz="2400" dirty="0" smtClean="0"/>
+              <a:t>       </a:t>
+            </a:r>
+            <a:r>
+              <a:rPr lang="en-US" sz="2000" dirty="0" smtClean="0">
+                <a:solidFill>
+                  <a:schemeClr val="accent6">
+                    <a:lumMod val="50000"/>
+                  </a:schemeClr>
+                </a:solidFill>
+              </a:rPr>
+              <a:t>stride of 1 	        2-gram</a:t>
+            </a:r>
+            <a:endParaRPr lang="en-US" sz="2000" dirty="0">
               <a:solidFill>
                 <a:schemeClr val="accent6">
                   <a:lumMod val="50000"/>
@@ -10409,36 +10520,174 @@
               </a:solidFill>
             </a:endParaRPr>
           </a:p>
-          <a:p>
-            <a:r>
-              <a:rPr lang="en-US" sz="2800" dirty="0" smtClean="0"/>
-              <a:t> Sentence after stop word removal and lemma [ TODO ]</a:t>
-            </a:r>
-          </a:p>
-          <a:p>
-            <a:r>
-              <a:rPr lang="en-US" sz="2800" dirty="0" smtClean="0"/>
-              <a:t>[ quick, brown, fox, jump, lazy, dog ]</a:t>
-            </a:r>
-            <a:endParaRPr lang="en-US" sz="2800" dirty="0" smtClean="0">
-              <a:solidFill>
-                <a:schemeClr val="accent6">
-                  <a:lumMod val="50000"/>
-                </a:schemeClr>
-              </a:solidFill>
-            </a:endParaRPr>
-          </a:p>
-          <a:p>
-            <a:endParaRPr lang="en-US" sz="2800" dirty="0">
-              <a:solidFill>
-                <a:schemeClr val="accent6">
-                  <a:lumMod val="50000"/>
-                </a:schemeClr>
-              </a:solidFill>
-            </a:endParaRPr>
-          </a:p>
-        </p:txBody>
-      </p:sp>
+        </p:txBody>
+      </p:sp>
+      <p:sp>
+        <p:nvSpPr>
+          <p:cNvPr id="4" name="Right Brace 3"/>
+          <p:cNvSpPr/>
+          <p:nvPr/>
+        </p:nvSpPr>
+        <p:spPr>
+          <a:xfrm rot="16200000">
+            <a:off x="3048000" y="4838698"/>
+            <a:ext cx="381000" cy="1295400"/>
+          </a:xfrm>
+          <a:prstGeom prst="rightBrace">
+            <a:avLst/>
+          </a:prstGeom>
+          <a:ln>
+            <a:solidFill>
+              <a:schemeClr val="accent6">
+                <a:lumMod val="50000"/>
+              </a:schemeClr>
+            </a:solidFill>
+          </a:ln>
+        </p:spPr>
+        <p:style>
+          <a:lnRef idx="1">
+            <a:schemeClr val="accent1"/>
+          </a:lnRef>
+          <a:fillRef idx="0">
+            <a:schemeClr val="accent1"/>
+          </a:fillRef>
+          <a:effectRef idx="0">
+            <a:schemeClr val="accent1"/>
+          </a:effectRef>
+          <a:fontRef idx="minor">
+            <a:schemeClr val="tx1"/>
+          </a:fontRef>
+        </p:style>
+        <p:txBody>
+          <a:bodyPr rtlCol="0" anchor="ctr"/>
+          <a:lstStyle/>
+          <a:p>
+            <a:pPr algn="ctr"/>
+            <a:endParaRPr lang="en-US"/>
+          </a:p>
+        </p:txBody>
+      </p:sp>
+      <p:sp>
+        <p:nvSpPr>
+          <p:cNvPr id="8" name="Right Brace 7"/>
+          <p:cNvSpPr/>
+          <p:nvPr/>
+        </p:nvSpPr>
+        <p:spPr>
+          <a:xfrm rot="5400000">
+            <a:off x="3916971" y="5448810"/>
+            <a:ext cx="381000" cy="1295400"/>
+          </a:xfrm>
+          <a:prstGeom prst="rightBrace">
+            <a:avLst/>
+          </a:prstGeom>
+          <a:ln>
+            <a:solidFill>
+              <a:schemeClr val="accent6">
+                <a:lumMod val="50000"/>
+              </a:schemeClr>
+            </a:solidFill>
+          </a:ln>
+        </p:spPr>
+        <p:style>
+          <a:lnRef idx="1">
+            <a:schemeClr val="accent1"/>
+          </a:lnRef>
+          <a:fillRef idx="0">
+            <a:schemeClr val="accent1"/>
+          </a:fillRef>
+          <a:effectRef idx="0">
+            <a:schemeClr val="accent1"/>
+          </a:effectRef>
+          <a:fontRef idx="minor">
+            <a:schemeClr val="tx1"/>
+          </a:fontRef>
+        </p:style>
+        <p:txBody>
+          <a:bodyPr rtlCol="0" anchor="ctr"/>
+          <a:lstStyle/>
+          <a:p>
+            <a:pPr algn="ctr"/>
+            <a:endParaRPr lang="en-US"/>
+          </a:p>
+        </p:txBody>
+      </p:sp>
+      <p:cxnSp>
+        <p:nvCxnSpPr>
+          <p:cNvPr id="9" name="Straight Connector 8"/>
+          <p:cNvCxnSpPr/>
+          <p:nvPr/>
+        </p:nvCxnSpPr>
+        <p:spPr>
+          <a:xfrm>
+            <a:off x="2743200" y="5906010"/>
+            <a:ext cx="0" cy="190500"/>
+          </a:xfrm>
+          <a:prstGeom prst="line">
+            <a:avLst/>
+          </a:prstGeom>
+          <a:ln w="19050">
+            <a:solidFill>
+              <a:schemeClr val="accent6">
+                <a:lumMod val="50000"/>
+              </a:schemeClr>
+            </a:solidFill>
+          </a:ln>
+        </p:spPr>
+        <p:style>
+          <a:lnRef idx="1">
+            <a:schemeClr val="accent1"/>
+          </a:lnRef>
+          <a:fillRef idx="0">
+            <a:schemeClr val="accent1"/>
+          </a:fillRef>
+          <a:effectRef idx="0">
+            <a:schemeClr val="accent1"/>
+          </a:effectRef>
+          <a:fontRef idx="minor">
+            <a:schemeClr val="tx1"/>
+          </a:fontRef>
+        </p:style>
+      </p:cxnSp>
+      <p:cxnSp>
+        <p:nvCxnSpPr>
+          <p:cNvPr id="13" name="Straight Arrow Connector 12"/>
+          <p:cNvCxnSpPr/>
+          <p:nvPr/>
+        </p:nvCxnSpPr>
+        <p:spPr>
+          <a:xfrm>
+            <a:off x="2743200" y="6001260"/>
+            <a:ext cx="716571" cy="0"/>
+          </a:xfrm>
+          <a:prstGeom prst="straightConnector1">
+            <a:avLst/>
+          </a:prstGeom>
+          <a:ln w="19050">
+            <a:solidFill>
+              <a:schemeClr val="accent6">
+                <a:lumMod val="50000"/>
+              </a:schemeClr>
+            </a:solidFill>
+            <a:prstDash val="sysDash"/>
+            <a:tailEnd type="arrow"/>
+          </a:ln>
+        </p:spPr>
+        <p:style>
+          <a:lnRef idx="1">
+            <a:schemeClr val="accent1"/>
+          </a:lnRef>
+          <a:fillRef idx="0">
+            <a:schemeClr val="accent1"/>
+          </a:fillRef>
+          <a:effectRef idx="0">
+            <a:schemeClr val="accent1"/>
+          </a:effectRef>
+          <a:fontRef idx="minor">
+            <a:schemeClr val="tx1"/>
+          </a:fontRef>
+        </p:style>
+      </p:cxnSp>
     </p:spTree>
     <p:extLst>
       <p:ext uri="{BB962C8B-B14F-4D97-AF65-F5344CB8AC3E}">
@@ -10507,7 +10756,7 @@
                   </a:schemeClr>
                 </a:solidFill>
               </a:rPr>
-              <a:t>More – Not Covered</a:t>
+              <a:t>Advance Topics – N-grams</a:t>
             </a:r>
             <a:endParaRPr lang="en-US" dirty="0">
               <a:solidFill>
@@ -10605,8 +10854,8 @@
         </p:nvSpPr>
         <p:spPr>
           <a:xfrm>
-            <a:off x="457200" y="1447797"/>
-            <a:ext cx="6987554" cy="3970318"/>
+            <a:off x="1156962" y="1437852"/>
+            <a:ext cx="6830075" cy="1384995"/>
           </a:xfrm>
           <a:prstGeom prst="rect">
             <a:avLst/>
@@ -10619,128 +10868,397 @@
           </a:bodyPr>
           <a:lstStyle/>
           <a:p>
-            <a:endParaRPr lang="en-US" sz="2800" dirty="0" smtClean="0">
+            <a:r>
+              <a:rPr lang="en-US" sz="2800" i="1" dirty="0"/>
+              <a:t>The quick brown fox jumped over the lazy </a:t>
+            </a:r>
+            <a:r>
+              <a:rPr lang="en-US" sz="2800" i="1" dirty="0" smtClean="0"/>
+              <a:t>dog</a:t>
+            </a:r>
+          </a:p>
+          <a:p>
+            <a:endParaRPr lang="en-US" sz="2800" i="1" dirty="0">
               <a:solidFill>
-                <a:schemeClr val="accent6">
-                  <a:lumMod val="50000"/>
-                </a:schemeClr>
+                <a:srgbClr val="0070C0"/>
               </a:solidFill>
             </a:endParaRPr>
           </a:p>
           <a:p>
-            <a:pPr marL="342900" indent="-342900">
-              <a:buFont typeface="Arial" panose="020B0604020202020204" pitchFamily="34" charset="0"/>
-              <a:buChar char="•"/>
-            </a:pPr>
-            <a:r>
-              <a:rPr lang="en-US" sz="2800" dirty="0" smtClean="0">
-                <a:solidFill>
-                  <a:schemeClr val="accent6">
-                    <a:lumMod val="50000"/>
-                  </a:schemeClr>
-                </a:solidFill>
-              </a:rPr>
-              <a:t>N-grams	(2 word pairs, 3 word pairs, …)</a:t>
-            </a:r>
-          </a:p>
-          <a:p>
-            <a:endParaRPr lang="en-US" sz="2800" dirty="0" smtClean="0">
-              <a:solidFill>
-                <a:schemeClr val="accent6">
-                  <a:lumMod val="50000"/>
-                </a:schemeClr>
-              </a:solidFill>
-            </a:endParaRPr>
-          </a:p>
-          <a:p>
-            <a:pPr marL="342900" indent="-342900">
-              <a:buFont typeface="Arial" panose="020B0604020202020204" pitchFamily="34" charset="0"/>
-              <a:buChar char="•"/>
-            </a:pPr>
-            <a:r>
-              <a:rPr lang="en-US" sz="2800" dirty="0" smtClean="0">
-                <a:solidFill>
-                  <a:schemeClr val="accent6">
-                    <a:lumMod val="50000"/>
-                  </a:schemeClr>
-                </a:solidFill>
-              </a:rPr>
-              <a:t>Word-Vectors</a:t>
-            </a:r>
-          </a:p>
-          <a:p>
-            <a:pPr marL="342900" indent="-342900">
-              <a:buFont typeface="Arial" panose="020B0604020202020204" pitchFamily="34" charset="0"/>
-              <a:buChar char="•"/>
-            </a:pPr>
-            <a:endParaRPr lang="en-US" sz="2800" dirty="0" smtClean="0">
-              <a:solidFill>
-                <a:schemeClr val="accent6">
-                  <a:lumMod val="50000"/>
-                </a:schemeClr>
-              </a:solidFill>
-            </a:endParaRPr>
-          </a:p>
-          <a:p>
-            <a:pPr marL="342900" indent="-342900">
-              <a:buFont typeface="Arial" panose="020B0604020202020204" pitchFamily="34" charset="0"/>
-              <a:buChar char="•"/>
-            </a:pPr>
-            <a:r>
-              <a:rPr lang="en-US" sz="2800" dirty="0" smtClean="0">
-                <a:solidFill>
-                  <a:schemeClr val="accent6">
-                    <a:lumMod val="50000"/>
-                  </a:schemeClr>
-                </a:solidFill>
-              </a:rPr>
-              <a:t>Correcting Misspellings</a:t>
-            </a:r>
-          </a:p>
-          <a:p>
-            <a:pPr marL="342900" indent="-342900">
-              <a:buFont typeface="Arial" panose="020B0604020202020204" pitchFamily="34" charset="0"/>
-              <a:buChar char="•"/>
-            </a:pPr>
-            <a:endParaRPr lang="en-US" sz="2800" dirty="0" smtClean="0">
-              <a:solidFill>
-                <a:schemeClr val="accent6">
-                  <a:lumMod val="50000"/>
-                </a:schemeClr>
-              </a:solidFill>
-            </a:endParaRPr>
-          </a:p>
-          <a:p>
-            <a:pPr marL="342900" indent="-342900">
-              <a:buFont typeface="Arial" panose="020B0604020202020204" pitchFamily="34" charset="0"/>
-              <a:buChar char="•"/>
-            </a:pPr>
-            <a:r>
-              <a:rPr lang="en-US" sz="2800" dirty="0" smtClean="0">
-                <a:solidFill>
-                  <a:schemeClr val="accent6">
-                    <a:lumMod val="50000"/>
-                  </a:schemeClr>
-                </a:solidFill>
-              </a:rPr>
-              <a:t>Detecting incorrectly categorized Narratives.</a:t>
-            </a:r>
-          </a:p>
-          <a:p>
-            <a:endParaRPr lang="en-US" sz="2800" dirty="0">
-              <a:solidFill>
-                <a:schemeClr val="accent6">
-                  <a:lumMod val="50000"/>
-                </a:schemeClr>
-              </a:solidFill>
-            </a:endParaRPr>
-          </a:p>
-        </p:txBody>
-      </p:sp>
+            <a:r>
+              <a:rPr lang="en-US" sz="2800" i="1" dirty="0" smtClean="0"/>
+              <a:t>        quick, brown, fox, jump, lazy, dog</a:t>
+            </a:r>
+          </a:p>
+        </p:txBody>
+      </p:sp>
+      <p:sp>
+        <p:nvSpPr>
+          <p:cNvPr id="6" name="Down Arrow 5"/>
+          <p:cNvSpPr/>
+          <p:nvPr/>
+        </p:nvSpPr>
+        <p:spPr>
+          <a:xfrm>
+            <a:off x="4076700" y="1981200"/>
+            <a:ext cx="762000" cy="381000"/>
+          </a:xfrm>
+          <a:prstGeom prst="downArrow">
+            <a:avLst/>
+          </a:prstGeom>
+        </p:spPr>
+        <p:style>
+          <a:lnRef idx="2">
+            <a:schemeClr val="accent1">
+              <a:shade val="50000"/>
+            </a:schemeClr>
+          </a:lnRef>
+          <a:fillRef idx="1">
+            <a:schemeClr val="accent1"/>
+          </a:fillRef>
+          <a:effectRef idx="0">
+            <a:schemeClr val="accent1"/>
+          </a:effectRef>
+          <a:fontRef idx="minor">
+            <a:schemeClr val="lt1"/>
+          </a:fontRef>
+        </p:style>
+        <p:txBody>
+          <a:bodyPr rtlCol="0" anchor="ctr"/>
+          <a:lstStyle/>
+          <a:p>
+            <a:pPr algn="ctr"/>
+            <a:endParaRPr lang="en-US"/>
+          </a:p>
+        </p:txBody>
+      </p:sp>
+      <p:sp>
+        <p:nvSpPr>
+          <p:cNvPr id="10" name="TextBox 9"/>
+          <p:cNvSpPr txBox="1"/>
+          <p:nvPr/>
+        </p:nvSpPr>
+        <p:spPr>
+          <a:xfrm>
+            <a:off x="533400" y="3124200"/>
+            <a:ext cx="2235997" cy="2554545"/>
+          </a:xfrm>
+          <a:prstGeom prst="rect">
+            <a:avLst/>
+          </a:prstGeom>
+          <a:noFill/>
+        </p:spPr>
+        <p:txBody>
+          <a:bodyPr wrap="none" rtlCol="0">
+            <a:spAutoFit/>
+          </a:bodyPr>
+          <a:lstStyle/>
+          <a:p>
+            <a:r>
+              <a:rPr lang="en-US" sz="2000" b="1" dirty="0" smtClean="0"/>
+              <a:t>2-grams, stride of 1</a:t>
+            </a:r>
+          </a:p>
+          <a:p>
+            <a:endParaRPr lang="en-US" sz="2000" dirty="0"/>
+          </a:p>
+          <a:p>
+            <a:r>
+              <a:rPr lang="en-US" sz="2000" dirty="0" smtClean="0"/>
+              <a:t>quick, brown</a:t>
+            </a:r>
+          </a:p>
+          <a:p>
+            <a:r>
+              <a:rPr lang="en-US" sz="2000" dirty="0" smtClean="0"/>
+              <a:t>brown, fox</a:t>
+            </a:r>
+          </a:p>
+          <a:p>
+            <a:r>
+              <a:rPr lang="en-US" sz="2000" dirty="0" smtClean="0"/>
+              <a:t>fox, jump</a:t>
+            </a:r>
+          </a:p>
+          <a:p>
+            <a:r>
+              <a:rPr lang="en-US" sz="2000" dirty="0" smtClean="0"/>
+              <a:t>jump, lazy</a:t>
+            </a:r>
+          </a:p>
+          <a:p>
+            <a:r>
+              <a:rPr lang="en-US" sz="2000" dirty="0" smtClean="0"/>
+              <a:t>lazy, dog</a:t>
+            </a:r>
+          </a:p>
+          <a:p>
+            <a:r>
+              <a:rPr lang="en-US" sz="2000" dirty="0" smtClean="0"/>
+              <a:t>Dog, &lt;null&gt;</a:t>
+            </a:r>
+            <a:endParaRPr lang="en-US" sz="2000" dirty="0"/>
+          </a:p>
+        </p:txBody>
+      </p:sp>
+      <p:graphicFrame>
+        <p:nvGraphicFramePr>
+          <p:cNvPr id="11" name="Table 10"/>
+          <p:cNvGraphicFramePr>
+            <a:graphicFrameLocks noGrp="1"/>
+          </p:cNvGraphicFramePr>
+          <p:nvPr>
+            <p:extLst>
+              <p:ext uri="{D42A27DB-BD31-4B8C-83A1-F6EECF244321}">
+                <p14:modId xmlns:p14="http://schemas.microsoft.com/office/powerpoint/2010/main" val="1575389921"/>
+              </p:ext>
+            </p:extLst>
+          </p:nvPr>
+        </p:nvGraphicFramePr>
+        <p:xfrm>
+          <a:off x="2895600" y="4191000"/>
+          <a:ext cx="6096000" cy="1010920"/>
+        </p:xfrm>
+        <a:graphic>
+          <a:graphicData uri="http://schemas.openxmlformats.org/drawingml/2006/table">
+            <a:tbl>
+              <a:tblPr firstRow="1" bandRow="1">
+                <a:tableStyleId>{5C22544A-7EE6-4342-B048-85BDC9FD1C3A}</a:tableStyleId>
+              </a:tblPr>
+              <a:tblGrid>
+                <a:gridCol w="1016000"/>
+                <a:gridCol w="1016000"/>
+                <a:gridCol w="1016000"/>
+                <a:gridCol w="1016000"/>
+                <a:gridCol w="1016000"/>
+                <a:gridCol w="1016000"/>
+              </a:tblGrid>
+              <a:tr h="370840">
+                <a:tc>
+                  <a:txBody>
+                    <a:bodyPr/>
+                    <a:lstStyle/>
+                    <a:p>
+                      <a:r>
+                        <a:rPr lang="en-US" sz="1600" dirty="0" smtClean="0"/>
+                        <a:t>Feature 1</a:t>
+                      </a:r>
+                      <a:endParaRPr lang="en-US" sz="1600" dirty="0"/>
+                    </a:p>
+                  </a:txBody>
+                  <a:tcPr/>
+                </a:tc>
+                <a:tc>
+                  <a:txBody>
+                    <a:bodyPr/>
+                    <a:lstStyle/>
+                    <a:p>
+                      <a:r>
+                        <a:rPr lang="en-US" sz="1600" dirty="0" smtClean="0"/>
+                        <a:t>Feature</a:t>
+                      </a:r>
+                      <a:r>
+                        <a:rPr lang="en-US" sz="1600" baseline="0" dirty="0" smtClean="0"/>
+                        <a:t> 2</a:t>
+                      </a:r>
+                      <a:endParaRPr lang="en-US" sz="1600" dirty="0"/>
+                    </a:p>
+                  </a:txBody>
+                  <a:tcPr/>
+                </a:tc>
+                <a:tc>
+                  <a:txBody>
+                    <a:bodyPr/>
+                    <a:lstStyle/>
+                    <a:p>
+                      <a:r>
+                        <a:rPr lang="en-US" sz="1600" dirty="0" smtClean="0"/>
+                        <a:t>Feature 3</a:t>
+                      </a:r>
+                      <a:endParaRPr lang="en-US" sz="1600" dirty="0"/>
+                    </a:p>
+                  </a:txBody>
+                  <a:tcPr/>
+                </a:tc>
+                <a:tc>
+                  <a:txBody>
+                    <a:bodyPr/>
+                    <a:lstStyle/>
+                    <a:p>
+                      <a:r>
+                        <a:rPr lang="en-US" sz="1600" dirty="0" smtClean="0"/>
+                        <a:t>Feature 4</a:t>
+                      </a:r>
+                      <a:endParaRPr lang="en-US" sz="1600" dirty="0"/>
+                    </a:p>
+                  </a:txBody>
+                  <a:tcPr/>
+                </a:tc>
+                <a:tc>
+                  <a:txBody>
+                    <a:bodyPr/>
+                    <a:lstStyle/>
+                    <a:p>
+                      <a:r>
+                        <a:rPr lang="en-US" sz="1600" dirty="0" smtClean="0"/>
+                        <a:t>Feature 5</a:t>
+                      </a:r>
+                      <a:endParaRPr lang="en-US" sz="1600" dirty="0"/>
+                    </a:p>
+                  </a:txBody>
+                  <a:tcPr/>
+                </a:tc>
+                <a:tc>
+                  <a:txBody>
+                    <a:bodyPr/>
+                    <a:lstStyle/>
+                    <a:p>
+                      <a:r>
+                        <a:rPr lang="en-US" sz="1600" dirty="0" smtClean="0"/>
+                        <a:t>Feature</a:t>
+                      </a:r>
+                      <a:r>
+                        <a:rPr lang="en-US" sz="1600" baseline="0" dirty="0" smtClean="0"/>
+                        <a:t> 6</a:t>
+                      </a:r>
+                      <a:endParaRPr lang="en-US" sz="1600" dirty="0"/>
+                    </a:p>
+                  </a:txBody>
+                  <a:tcPr/>
+                </a:tc>
+              </a:tr>
+              <a:tr h="370840">
+                <a:tc>
+                  <a:txBody>
+                    <a:bodyPr/>
+                    <a:lstStyle/>
+                    <a:p>
+                      <a:r>
+                        <a:rPr lang="en-US" dirty="0" smtClean="0"/>
+                        <a:t>quick,</a:t>
+                      </a:r>
+                      <a:br>
+                        <a:rPr lang="en-US" dirty="0" smtClean="0"/>
+                      </a:br>
+                      <a:r>
+                        <a:rPr lang="en-US" dirty="0" smtClean="0"/>
+                        <a:t>brown</a:t>
+                      </a:r>
+                      <a:endParaRPr lang="en-US" dirty="0"/>
+                    </a:p>
+                  </a:txBody>
+                  <a:tcPr/>
+                </a:tc>
+                <a:tc>
+                  <a:txBody>
+                    <a:bodyPr/>
+                    <a:lstStyle/>
+                    <a:p>
+                      <a:r>
+                        <a:rPr lang="en-US" dirty="0" smtClean="0"/>
+                        <a:t>brown,</a:t>
+                      </a:r>
+                      <a:br>
+                        <a:rPr lang="en-US" dirty="0" smtClean="0"/>
+                      </a:br>
+                      <a:r>
+                        <a:rPr lang="en-US" dirty="0" smtClean="0"/>
+                        <a:t>fox</a:t>
+                      </a:r>
+                      <a:endParaRPr lang="en-US" dirty="0"/>
+                    </a:p>
+                  </a:txBody>
+                  <a:tcPr/>
+                </a:tc>
+                <a:tc>
+                  <a:txBody>
+                    <a:bodyPr/>
+                    <a:lstStyle/>
+                    <a:p>
+                      <a:r>
+                        <a:rPr lang="en-US" dirty="0" smtClean="0"/>
+                        <a:t>fox,</a:t>
+                      </a:r>
+                    </a:p>
+                    <a:p>
+                      <a:r>
+                        <a:rPr lang="en-US" dirty="0" smtClean="0"/>
+                        <a:t>jump</a:t>
+                      </a:r>
+                      <a:endParaRPr lang="en-US" dirty="0"/>
+                    </a:p>
+                  </a:txBody>
+                  <a:tcPr/>
+                </a:tc>
+                <a:tc>
+                  <a:txBody>
+                    <a:bodyPr/>
+                    <a:lstStyle/>
+                    <a:p>
+                      <a:r>
+                        <a:rPr lang="en-US" dirty="0" smtClean="0"/>
+                        <a:t>Jump,</a:t>
+                      </a:r>
+                    </a:p>
+                    <a:p>
+                      <a:r>
+                        <a:rPr lang="en-US" dirty="0" smtClean="0"/>
+                        <a:t>lazy</a:t>
+                      </a:r>
+                      <a:endParaRPr lang="en-US" dirty="0"/>
+                    </a:p>
+                  </a:txBody>
+                  <a:tcPr/>
+                </a:tc>
+                <a:tc>
+                  <a:txBody>
+                    <a:bodyPr/>
+                    <a:lstStyle/>
+                    <a:p>
+                      <a:r>
+                        <a:rPr lang="en-US" dirty="0" smtClean="0"/>
+                        <a:t>Lazy,</a:t>
+                      </a:r>
+                    </a:p>
+                    <a:p>
+                      <a:r>
+                        <a:rPr lang="en-US" dirty="0" smtClean="0"/>
+                        <a:t>dog</a:t>
+                      </a:r>
+                      <a:endParaRPr lang="en-US" dirty="0"/>
+                    </a:p>
+                  </a:txBody>
+                  <a:tcPr/>
+                </a:tc>
+                <a:tc>
+                  <a:txBody>
+                    <a:bodyPr/>
+                    <a:lstStyle/>
+                    <a:p>
+                      <a:r>
+                        <a:rPr lang="en-US" dirty="0" smtClean="0"/>
+                        <a:t>dog,</a:t>
+                      </a:r>
+                    </a:p>
+                    <a:p>
+                      <a:r>
+                        <a:rPr lang="en-US" dirty="0" smtClean="0"/>
+                        <a:t>&lt;null&gt;</a:t>
+                      </a:r>
+                      <a:endParaRPr lang="en-US" dirty="0"/>
+                    </a:p>
+                  </a:txBody>
+                  <a:tcPr/>
+                </a:tc>
+              </a:tr>
+            </a:tbl>
+          </a:graphicData>
+        </a:graphic>
+      </p:graphicFrame>
     </p:spTree>
     <p:extLst>
       <p:ext uri="{BB962C8B-B14F-4D97-AF65-F5344CB8AC3E}">
-        <p14:creationId xmlns:p14="http://schemas.microsoft.com/office/powerpoint/2010/main" val="306392594"/>
+        <p14:creationId xmlns:p14="http://schemas.microsoft.com/office/powerpoint/2010/main" val="4141505945"/>
       </p:ext>
     </p:extLst>
   </p:cSld>
@@ -10805,6 +11323,279 @@
                   </a:schemeClr>
                 </a:solidFill>
               </a:rPr>
+              <a:t>More – Not Covered</a:t>
+            </a:r>
+            <a:endParaRPr lang="en-US" dirty="0">
+              <a:solidFill>
+                <a:schemeClr val="accent1">
+                  <a:lumMod val="75000"/>
+                </a:schemeClr>
+              </a:solidFill>
+            </a:endParaRPr>
+          </a:p>
+        </p:txBody>
+      </p:sp>
+      <p:sp>
+        <p:nvSpPr>
+          <p:cNvPr id="3" name="Content Placeholder 2"/>
+          <p:cNvSpPr>
+            <a:spLocks noGrp="1"/>
+          </p:cNvSpPr>
+          <p:nvPr>
+            <p:ph idx="1"/>
+          </p:nvPr>
+        </p:nvSpPr>
+        <p:spPr>
+          <a:xfrm>
+            <a:off x="304800" y="1219201"/>
+            <a:ext cx="8229600" cy="3733800"/>
+          </a:xfrm>
+        </p:spPr>
+        <p:txBody>
+          <a:bodyPr>
+            <a:normAutofit/>
+          </a:bodyPr>
+          <a:lstStyle/>
+          <a:p>
+            <a:pPr marL="0" indent="0">
+              <a:buNone/>
+            </a:pPr>
+            <a:endParaRPr lang="en-US" dirty="0" smtClean="0"/>
+          </a:p>
+          <a:p>
+            <a:pPr marL="0" indent="0">
+              <a:buNone/>
+            </a:pPr>
+            <a:endParaRPr lang="en-US" dirty="0" smtClean="0"/>
+          </a:p>
+          <a:p>
+            <a:pPr marL="0" indent="0">
+              <a:buNone/>
+            </a:pPr>
+            <a:endParaRPr lang="en-US" dirty="0" smtClean="0"/>
+          </a:p>
+          <a:p>
+            <a:pPr marL="0" indent="0">
+              <a:buNone/>
+            </a:pPr>
+            <a:endParaRPr lang="en-US" dirty="0"/>
+          </a:p>
+        </p:txBody>
+      </p:sp>
+      <p:cxnSp>
+        <p:nvCxnSpPr>
+          <p:cNvPr id="5" name="Straight Connector 4"/>
+          <p:cNvCxnSpPr/>
+          <p:nvPr/>
+        </p:nvCxnSpPr>
+        <p:spPr>
+          <a:xfrm>
+            <a:off x="0" y="990600"/>
+            <a:ext cx="9144000" cy="0"/>
+          </a:xfrm>
+          <a:prstGeom prst="line">
+            <a:avLst/>
+          </a:prstGeom>
+          <a:ln w="19050"/>
+        </p:spPr>
+        <p:style>
+          <a:lnRef idx="1">
+            <a:schemeClr val="accent1"/>
+          </a:lnRef>
+          <a:fillRef idx="0">
+            <a:schemeClr val="accent1"/>
+          </a:fillRef>
+          <a:effectRef idx="0">
+            <a:schemeClr val="accent1"/>
+          </a:effectRef>
+          <a:fontRef idx="minor">
+            <a:schemeClr val="tx1"/>
+          </a:fontRef>
+        </p:style>
+      </p:cxnSp>
+      <p:sp>
+        <p:nvSpPr>
+          <p:cNvPr id="7" name="TextBox 6"/>
+          <p:cNvSpPr txBox="1"/>
+          <p:nvPr/>
+        </p:nvSpPr>
+        <p:spPr>
+          <a:xfrm>
+            <a:off x="457200" y="1447797"/>
+            <a:ext cx="6987554" cy="3108543"/>
+          </a:xfrm>
+          <a:prstGeom prst="rect">
+            <a:avLst/>
+          </a:prstGeom>
+          <a:noFill/>
+        </p:spPr>
+        <p:txBody>
+          <a:bodyPr wrap="none" rtlCol="0">
+            <a:spAutoFit/>
+          </a:bodyPr>
+          <a:lstStyle/>
+          <a:p>
+            <a:endParaRPr lang="en-US" sz="2800" dirty="0" smtClean="0">
+              <a:solidFill>
+                <a:schemeClr val="accent6">
+                  <a:lumMod val="50000"/>
+                </a:schemeClr>
+              </a:solidFill>
+            </a:endParaRPr>
+          </a:p>
+          <a:p>
+            <a:pPr marL="342900" indent="-342900">
+              <a:buFont typeface="Arial" panose="020B0604020202020204" pitchFamily="34" charset="0"/>
+              <a:buChar char="•"/>
+            </a:pPr>
+            <a:r>
+              <a:rPr lang="en-US" sz="2800" dirty="0" smtClean="0">
+                <a:solidFill>
+                  <a:schemeClr val="accent6">
+                    <a:lumMod val="50000"/>
+                  </a:schemeClr>
+                </a:solidFill>
+              </a:rPr>
+              <a:t>Word-Vectors</a:t>
+            </a:r>
+          </a:p>
+          <a:p>
+            <a:pPr marL="342900" indent="-342900">
+              <a:buFont typeface="Arial" panose="020B0604020202020204" pitchFamily="34" charset="0"/>
+              <a:buChar char="•"/>
+            </a:pPr>
+            <a:endParaRPr lang="en-US" sz="2800" dirty="0" smtClean="0">
+              <a:solidFill>
+                <a:schemeClr val="accent6">
+                  <a:lumMod val="50000"/>
+                </a:schemeClr>
+              </a:solidFill>
+            </a:endParaRPr>
+          </a:p>
+          <a:p>
+            <a:pPr marL="342900" indent="-342900">
+              <a:buFont typeface="Arial" panose="020B0604020202020204" pitchFamily="34" charset="0"/>
+              <a:buChar char="•"/>
+            </a:pPr>
+            <a:r>
+              <a:rPr lang="en-US" sz="2800" dirty="0" smtClean="0">
+                <a:solidFill>
+                  <a:schemeClr val="accent6">
+                    <a:lumMod val="50000"/>
+                  </a:schemeClr>
+                </a:solidFill>
+              </a:rPr>
+              <a:t>Correcting Misspellings</a:t>
+            </a:r>
+          </a:p>
+          <a:p>
+            <a:pPr marL="342900" indent="-342900">
+              <a:buFont typeface="Arial" panose="020B0604020202020204" pitchFamily="34" charset="0"/>
+              <a:buChar char="•"/>
+            </a:pPr>
+            <a:endParaRPr lang="en-US" sz="2800" dirty="0" smtClean="0">
+              <a:solidFill>
+                <a:schemeClr val="accent6">
+                  <a:lumMod val="50000"/>
+                </a:schemeClr>
+              </a:solidFill>
+            </a:endParaRPr>
+          </a:p>
+          <a:p>
+            <a:pPr marL="342900" indent="-342900">
+              <a:buFont typeface="Arial" panose="020B0604020202020204" pitchFamily="34" charset="0"/>
+              <a:buChar char="•"/>
+            </a:pPr>
+            <a:r>
+              <a:rPr lang="en-US" sz="2800" dirty="0" smtClean="0">
+                <a:solidFill>
+                  <a:schemeClr val="accent6">
+                    <a:lumMod val="50000"/>
+                  </a:schemeClr>
+                </a:solidFill>
+              </a:rPr>
+              <a:t>Detecting incorrectly categorized Narratives.</a:t>
+            </a:r>
+          </a:p>
+          <a:p>
+            <a:endParaRPr lang="en-US" sz="2800" dirty="0">
+              <a:solidFill>
+                <a:schemeClr val="accent6">
+                  <a:lumMod val="50000"/>
+                </a:schemeClr>
+              </a:solidFill>
+            </a:endParaRPr>
+          </a:p>
+        </p:txBody>
+      </p:sp>
+    </p:spTree>
+    <p:extLst>
+      <p:ext uri="{BB962C8B-B14F-4D97-AF65-F5344CB8AC3E}">
+        <p14:creationId xmlns:p14="http://schemas.microsoft.com/office/powerpoint/2010/main" val="306392594"/>
+      </p:ext>
+    </p:extLst>
+  </p:cSld>
+  <p:clrMapOvr>
+    <a:masterClrMapping/>
+  </p:clrMapOvr>
+  <p:timing>
+    <p:tnLst>
+      <p:par>
+        <p:cTn id="1" dur="indefinite" restart="never" nodeType="tmRoot"/>
+      </p:par>
+    </p:tnLst>
+  </p:timing>
+</p:sld>
+</file>
+
+<file path=ppt/slides/slide23.xml><?xml version="1.0" encoding="utf-8"?>
+<p:sld xmlns:a="http://schemas.openxmlformats.org/drawingml/2006/main" xmlns:r="http://schemas.openxmlformats.org/officeDocument/2006/relationships" xmlns:p="http://schemas.openxmlformats.org/presentationml/2006/main">
+  <p:cSld>
+    <p:spTree>
+      <p:nvGrpSpPr>
+        <p:cNvPr id="1" name=""/>
+        <p:cNvGrpSpPr/>
+        <p:nvPr/>
+      </p:nvGrpSpPr>
+      <p:grpSpPr>
+        <a:xfrm>
+          <a:off x="0" y="0"/>
+          <a:ext cx="0" cy="0"/>
+          <a:chOff x="0" y="0"/>
+          <a:chExt cx="0" cy="0"/>
+        </a:xfrm>
+      </p:grpSpPr>
+      <p:sp>
+        <p:nvSpPr>
+          <p:cNvPr id="2" name="Title 1"/>
+          <p:cNvSpPr>
+            <a:spLocks noGrp="1"/>
+          </p:cNvSpPr>
+          <p:nvPr>
+            <p:ph type="title"/>
+          </p:nvPr>
+        </p:nvSpPr>
+        <p:spPr>
+          <a:xfrm>
+            <a:off x="457200" y="274638"/>
+            <a:ext cx="7848600" cy="792162"/>
+          </a:xfrm>
+        </p:spPr>
+        <p:txBody>
+          <a:bodyPr>
+            <a:normAutofit/>
+          </a:bodyPr>
+          <a:lstStyle/>
+          <a:p>
+            <a:pPr algn="l"/>
+            <a:r>
+              <a:rPr lang="en-US" dirty="0" smtClean="0">
+                <a:solidFill>
+                  <a:schemeClr val="accent1">
+                    <a:lumMod val="75000"/>
+                  </a:schemeClr>
+                </a:solidFill>
+              </a:rPr>
               <a:t>Final – Homegrown Tool</a:t>
             </a:r>
             <a:endParaRPr lang="en-US" dirty="0">
@@ -11049,7 +11840,7 @@
 </p:sld>
 </file>
 
-<file path=ppt/slides/slide23.xml><?xml version="1.0" encoding="utf-8"?>
+<file path=ppt/slides/slide24.xml><?xml version="1.0" encoding="utf-8"?>
 <p:sld xmlns:a="http://schemas.openxmlformats.org/drawingml/2006/main" xmlns:r="http://schemas.openxmlformats.org/officeDocument/2006/relationships" xmlns:p="http://schemas.openxmlformats.org/presentationml/2006/main">
   <p:cSld>
     <p:spTree>

</xml_diff>